<commit_message>
[hw01] Completed simple and medium baseline
</commit_message>
<xml_diff>
--- a/hw01.pptx
+++ b/hw01.pptx
@@ -4,8 +4,18 @@
   <p:sldMasterIdLst>
     <p:sldMasterId id="2147483648" r:id="rId1"/>
   </p:sldMasterIdLst>
+  <p:notesMasterIdLst>
+    <p:notesMasterId r:id="rId10"/>
+  </p:notesMasterIdLst>
   <p:sldIdLst>
-    <p:sldId id="256" r:id="rId2"/>
+    <p:sldId id="258" r:id="rId2"/>
+    <p:sldId id="259" r:id="rId3"/>
+    <p:sldId id="260" r:id="rId4"/>
+    <p:sldId id="261" r:id="rId5"/>
+    <p:sldId id="262" r:id="rId6"/>
+    <p:sldId id="263" r:id="rId7"/>
+    <p:sldId id="264" r:id="rId8"/>
+    <p:sldId id="265" r:id="rId9"/>
   </p:sldIdLst>
   <p:sldSz cx="12192000" cy="6858000"/>
   <p:notesSz cx="6858000" cy="9144000"/>
@@ -104,7 +114,1103 @@
       </a:defRPr>
     </a:lvl9pPr>
   </p:defaultTextStyle>
+  <p:extLst>
+    <p:ext uri="{EFAFB233-063F-42B5-8137-9DF3F51BA10A}">
+      <p15:sldGuideLst xmlns:p15="http://schemas.microsoft.com/office/powerpoint/2012/main"/>
+    </p:ext>
+  </p:extLst>
 </p:presentation>
+</file>
+
+<file path=ppt/notesMasters/notesMaster1.xml><?xml version="1.0" encoding="utf-8"?>
+<p:notesMaster xmlns:a="http://schemas.openxmlformats.org/drawingml/2006/main" xmlns:r="http://schemas.openxmlformats.org/officeDocument/2006/relationships" xmlns:p="http://schemas.openxmlformats.org/presentationml/2006/main">
+  <p:cSld>
+    <p:bg>
+      <p:bgRef idx="1001">
+        <a:schemeClr val="bg1"/>
+      </p:bgRef>
+    </p:bg>
+    <p:spTree>
+      <p:nvGrpSpPr>
+        <p:cNvPr id="1" name=""/>
+        <p:cNvGrpSpPr/>
+        <p:nvPr/>
+      </p:nvGrpSpPr>
+      <p:grpSpPr>
+        <a:xfrm>
+          <a:off x="0" y="0"/>
+          <a:ext cx="0" cy="0"/>
+          <a:chOff x="0" y="0"/>
+          <a:chExt cx="0" cy="0"/>
+        </a:xfrm>
+      </p:grpSpPr>
+      <p:sp>
+        <p:nvSpPr>
+          <p:cNvPr id="2" name="頁首版面配置區 1"/>
+          <p:cNvSpPr>
+            <a:spLocks noGrp="1"/>
+          </p:cNvSpPr>
+          <p:nvPr>
+            <p:ph type="hdr" sz="quarter"/>
+          </p:nvPr>
+        </p:nvSpPr>
+        <p:spPr>
+          <a:xfrm>
+            <a:off x="0" y="0"/>
+            <a:ext cx="2971800" cy="458788"/>
+          </a:xfrm>
+          <a:prstGeom prst="rect">
+            <a:avLst/>
+          </a:prstGeom>
+        </p:spPr>
+        <p:txBody>
+          <a:bodyPr vert="horz" lIns="91440" tIns="45720" rIns="91440" bIns="45720" rtlCol="0"/>
+          <a:lstStyle>
+            <a:lvl1pPr algn="l">
+              <a:defRPr sz="1200"/>
+            </a:lvl1pPr>
+          </a:lstStyle>
+          <a:p>
+            <a:endParaRPr lang="zh-TW" altLang="en-US"/>
+          </a:p>
+        </p:txBody>
+      </p:sp>
+      <p:sp>
+        <p:nvSpPr>
+          <p:cNvPr id="3" name="日期版面配置區 2"/>
+          <p:cNvSpPr>
+            <a:spLocks noGrp="1"/>
+          </p:cNvSpPr>
+          <p:nvPr>
+            <p:ph type="dt" idx="1"/>
+          </p:nvPr>
+        </p:nvSpPr>
+        <p:spPr>
+          <a:xfrm>
+            <a:off x="3884613" y="0"/>
+            <a:ext cx="2971800" cy="458788"/>
+          </a:xfrm>
+          <a:prstGeom prst="rect">
+            <a:avLst/>
+          </a:prstGeom>
+        </p:spPr>
+        <p:txBody>
+          <a:bodyPr vert="horz" lIns="91440" tIns="45720" rIns="91440" bIns="45720" rtlCol="0"/>
+          <a:lstStyle>
+            <a:lvl1pPr algn="r">
+              <a:defRPr sz="1200"/>
+            </a:lvl1pPr>
+          </a:lstStyle>
+          <a:p>
+            <a:fld id="{FF667865-6DE5-4796-86DC-687F74677F04}" type="datetimeFigureOut">
+              <a:rPr lang="zh-TW" altLang="en-US" smtClean="0"/>
+              <a:t>2024/10/26</a:t>
+            </a:fld>
+            <a:endParaRPr lang="zh-TW" altLang="en-US"/>
+          </a:p>
+        </p:txBody>
+      </p:sp>
+      <p:sp>
+        <p:nvSpPr>
+          <p:cNvPr id="4" name="投影片影像版面配置區 3"/>
+          <p:cNvSpPr>
+            <a:spLocks noGrp="1" noRot="1" noChangeAspect="1"/>
+          </p:cNvSpPr>
+          <p:nvPr>
+            <p:ph type="sldImg" idx="2"/>
+          </p:nvPr>
+        </p:nvSpPr>
+        <p:spPr>
+          <a:xfrm>
+            <a:off x="685800" y="1143000"/>
+            <a:ext cx="5486400" cy="3086100"/>
+          </a:xfrm>
+          <a:prstGeom prst="rect">
+            <a:avLst/>
+          </a:prstGeom>
+          <a:noFill/>
+          <a:ln w="12700">
+            <a:solidFill>
+              <a:prstClr val="black"/>
+            </a:solidFill>
+          </a:ln>
+        </p:spPr>
+        <p:txBody>
+          <a:bodyPr vert="horz" lIns="91440" tIns="45720" rIns="91440" bIns="45720" rtlCol="0" anchor="ctr"/>
+          <a:lstStyle/>
+          <a:p>
+            <a:endParaRPr lang="zh-TW" altLang="en-US"/>
+          </a:p>
+        </p:txBody>
+      </p:sp>
+      <p:sp>
+        <p:nvSpPr>
+          <p:cNvPr id="5" name="備忘稿版面配置區 4"/>
+          <p:cNvSpPr>
+            <a:spLocks noGrp="1"/>
+          </p:cNvSpPr>
+          <p:nvPr>
+            <p:ph type="body" sz="quarter" idx="3"/>
+          </p:nvPr>
+        </p:nvSpPr>
+        <p:spPr>
+          <a:xfrm>
+            <a:off x="685800" y="4400550"/>
+            <a:ext cx="5486400" cy="3600450"/>
+          </a:xfrm>
+          <a:prstGeom prst="rect">
+            <a:avLst/>
+          </a:prstGeom>
+        </p:spPr>
+        <p:txBody>
+          <a:bodyPr vert="horz" lIns="91440" tIns="45720" rIns="91440" bIns="45720" rtlCol="0"/>
+          <a:lstStyle/>
+          <a:p>
+            <a:pPr lvl="0"/>
+            <a:r>
+              <a:rPr lang="zh-TW" altLang="en-US"/>
+              <a:t>按一下以編輯母片文字樣式</a:t>
+            </a:r>
+          </a:p>
+          <a:p>
+            <a:pPr lvl="1"/>
+            <a:r>
+              <a:rPr lang="zh-TW" altLang="en-US"/>
+              <a:t>第二層</a:t>
+            </a:r>
+          </a:p>
+          <a:p>
+            <a:pPr lvl="2"/>
+            <a:r>
+              <a:rPr lang="zh-TW" altLang="en-US"/>
+              <a:t>第三層</a:t>
+            </a:r>
+          </a:p>
+          <a:p>
+            <a:pPr lvl="3"/>
+            <a:r>
+              <a:rPr lang="zh-TW" altLang="en-US"/>
+              <a:t>第四層</a:t>
+            </a:r>
+          </a:p>
+          <a:p>
+            <a:pPr lvl="4"/>
+            <a:r>
+              <a:rPr lang="zh-TW" altLang="en-US"/>
+              <a:t>第五層</a:t>
+            </a:r>
+          </a:p>
+        </p:txBody>
+      </p:sp>
+      <p:sp>
+        <p:nvSpPr>
+          <p:cNvPr id="6" name="頁尾版面配置區 5"/>
+          <p:cNvSpPr>
+            <a:spLocks noGrp="1"/>
+          </p:cNvSpPr>
+          <p:nvPr>
+            <p:ph type="ftr" sz="quarter" idx="4"/>
+          </p:nvPr>
+        </p:nvSpPr>
+        <p:spPr>
+          <a:xfrm>
+            <a:off x="0" y="8685213"/>
+            <a:ext cx="2971800" cy="458787"/>
+          </a:xfrm>
+          <a:prstGeom prst="rect">
+            <a:avLst/>
+          </a:prstGeom>
+        </p:spPr>
+        <p:txBody>
+          <a:bodyPr vert="horz" lIns="91440" tIns="45720" rIns="91440" bIns="45720" rtlCol="0" anchor="b"/>
+          <a:lstStyle>
+            <a:lvl1pPr algn="l">
+              <a:defRPr sz="1200"/>
+            </a:lvl1pPr>
+          </a:lstStyle>
+          <a:p>
+            <a:endParaRPr lang="zh-TW" altLang="en-US"/>
+          </a:p>
+        </p:txBody>
+      </p:sp>
+      <p:sp>
+        <p:nvSpPr>
+          <p:cNvPr id="7" name="投影片編號版面配置區 6"/>
+          <p:cNvSpPr>
+            <a:spLocks noGrp="1"/>
+          </p:cNvSpPr>
+          <p:nvPr>
+            <p:ph type="sldNum" sz="quarter" idx="5"/>
+          </p:nvPr>
+        </p:nvSpPr>
+        <p:spPr>
+          <a:xfrm>
+            <a:off x="3884613" y="8685213"/>
+            <a:ext cx="2971800" cy="458787"/>
+          </a:xfrm>
+          <a:prstGeom prst="rect">
+            <a:avLst/>
+          </a:prstGeom>
+        </p:spPr>
+        <p:txBody>
+          <a:bodyPr vert="horz" lIns="91440" tIns="45720" rIns="91440" bIns="45720" rtlCol="0" anchor="b"/>
+          <a:lstStyle>
+            <a:lvl1pPr algn="r">
+              <a:defRPr sz="1200"/>
+            </a:lvl1pPr>
+          </a:lstStyle>
+          <a:p>
+            <a:fld id="{6E3DB6C8-F213-43E3-857E-F7BDCA39C294}" type="slidenum">
+              <a:rPr lang="zh-TW" altLang="en-US" smtClean="0"/>
+              <a:t>‹#›</a:t>
+            </a:fld>
+            <a:endParaRPr lang="zh-TW" altLang="en-US"/>
+          </a:p>
+        </p:txBody>
+      </p:sp>
+    </p:spTree>
+    <p:extLst>
+      <p:ext uri="{BB962C8B-B14F-4D97-AF65-F5344CB8AC3E}">
+        <p14:creationId xmlns:p14="http://schemas.microsoft.com/office/powerpoint/2010/main" val="3534136224"/>
+      </p:ext>
+    </p:extLst>
+  </p:cSld>
+  <p:clrMap bg1="lt1" tx1="dk1" bg2="lt2" tx2="dk2" accent1="accent1" accent2="accent2" accent3="accent3" accent4="accent4" accent5="accent5" accent6="accent6" hlink="hlink" folHlink="folHlink"/>
+  <p:notesStyle>
+    <a:lvl1pPr marL="0" algn="l" defTabSz="914400" rtl="0" eaLnBrk="1" latinLnBrk="0" hangingPunct="1">
+      <a:defRPr sz="1200" kern="1200">
+        <a:solidFill>
+          <a:schemeClr val="tx1"/>
+        </a:solidFill>
+        <a:latin typeface="+mn-lt"/>
+        <a:ea typeface="+mn-ea"/>
+        <a:cs typeface="+mn-cs"/>
+      </a:defRPr>
+    </a:lvl1pPr>
+    <a:lvl2pPr marL="457200" algn="l" defTabSz="914400" rtl="0" eaLnBrk="1" latinLnBrk="0" hangingPunct="1">
+      <a:defRPr sz="1200" kern="1200">
+        <a:solidFill>
+          <a:schemeClr val="tx1"/>
+        </a:solidFill>
+        <a:latin typeface="+mn-lt"/>
+        <a:ea typeface="+mn-ea"/>
+        <a:cs typeface="+mn-cs"/>
+      </a:defRPr>
+    </a:lvl2pPr>
+    <a:lvl3pPr marL="914400" algn="l" defTabSz="914400" rtl="0" eaLnBrk="1" latinLnBrk="0" hangingPunct="1">
+      <a:defRPr sz="1200" kern="1200">
+        <a:solidFill>
+          <a:schemeClr val="tx1"/>
+        </a:solidFill>
+        <a:latin typeface="+mn-lt"/>
+        <a:ea typeface="+mn-ea"/>
+        <a:cs typeface="+mn-cs"/>
+      </a:defRPr>
+    </a:lvl3pPr>
+    <a:lvl4pPr marL="1371600" algn="l" defTabSz="914400" rtl="0" eaLnBrk="1" latinLnBrk="0" hangingPunct="1">
+      <a:defRPr sz="1200" kern="1200">
+        <a:solidFill>
+          <a:schemeClr val="tx1"/>
+        </a:solidFill>
+        <a:latin typeface="+mn-lt"/>
+        <a:ea typeface="+mn-ea"/>
+        <a:cs typeface="+mn-cs"/>
+      </a:defRPr>
+    </a:lvl4pPr>
+    <a:lvl5pPr marL="1828800" algn="l" defTabSz="914400" rtl="0" eaLnBrk="1" latinLnBrk="0" hangingPunct="1">
+      <a:defRPr sz="1200" kern="1200">
+        <a:solidFill>
+          <a:schemeClr val="tx1"/>
+        </a:solidFill>
+        <a:latin typeface="+mn-lt"/>
+        <a:ea typeface="+mn-ea"/>
+        <a:cs typeface="+mn-cs"/>
+      </a:defRPr>
+    </a:lvl5pPr>
+    <a:lvl6pPr marL="2286000" algn="l" defTabSz="914400" rtl="0" eaLnBrk="1" latinLnBrk="0" hangingPunct="1">
+      <a:defRPr sz="1200" kern="1200">
+        <a:solidFill>
+          <a:schemeClr val="tx1"/>
+        </a:solidFill>
+        <a:latin typeface="+mn-lt"/>
+        <a:ea typeface="+mn-ea"/>
+        <a:cs typeface="+mn-cs"/>
+      </a:defRPr>
+    </a:lvl6pPr>
+    <a:lvl7pPr marL="2743200" algn="l" defTabSz="914400" rtl="0" eaLnBrk="1" latinLnBrk="0" hangingPunct="1">
+      <a:defRPr sz="1200" kern="1200">
+        <a:solidFill>
+          <a:schemeClr val="tx1"/>
+        </a:solidFill>
+        <a:latin typeface="+mn-lt"/>
+        <a:ea typeface="+mn-ea"/>
+        <a:cs typeface="+mn-cs"/>
+      </a:defRPr>
+    </a:lvl7pPr>
+    <a:lvl8pPr marL="3200400" algn="l" defTabSz="914400" rtl="0" eaLnBrk="1" latinLnBrk="0" hangingPunct="1">
+      <a:defRPr sz="1200" kern="1200">
+        <a:solidFill>
+          <a:schemeClr val="tx1"/>
+        </a:solidFill>
+        <a:latin typeface="+mn-lt"/>
+        <a:ea typeface="+mn-ea"/>
+        <a:cs typeface="+mn-cs"/>
+      </a:defRPr>
+    </a:lvl8pPr>
+    <a:lvl9pPr marL="3657600" algn="l" defTabSz="914400" rtl="0" eaLnBrk="1" latinLnBrk="0" hangingPunct="1">
+      <a:defRPr sz="1200" kern="1200">
+        <a:solidFill>
+          <a:schemeClr val="tx1"/>
+        </a:solidFill>
+        <a:latin typeface="+mn-lt"/>
+        <a:ea typeface="+mn-ea"/>
+        <a:cs typeface="+mn-cs"/>
+      </a:defRPr>
+    </a:lvl9pPr>
+  </p:notesStyle>
+</p:notesMaster>
+</file>
+
+<file path=ppt/notesSlides/notesSlide1.xml><?xml version="1.0" encoding="utf-8"?>
+<p:notes xmlns:a="http://schemas.openxmlformats.org/drawingml/2006/main" xmlns:r="http://schemas.openxmlformats.org/officeDocument/2006/relationships" xmlns:p="http://schemas.openxmlformats.org/presentationml/2006/main">
+  <p:cSld>
+    <p:spTree>
+      <p:nvGrpSpPr>
+        <p:cNvPr id="1" name=""/>
+        <p:cNvGrpSpPr/>
+        <p:nvPr/>
+      </p:nvGrpSpPr>
+      <p:grpSpPr>
+        <a:xfrm>
+          <a:off x="0" y="0"/>
+          <a:ext cx="0" cy="0"/>
+          <a:chOff x="0" y="0"/>
+          <a:chExt cx="0" cy="0"/>
+        </a:xfrm>
+      </p:grpSpPr>
+      <p:sp>
+        <p:nvSpPr>
+          <p:cNvPr id="2" name="投影片影像版面配置區 1"/>
+          <p:cNvSpPr>
+            <a:spLocks noGrp="1" noRot="1" noChangeAspect="1"/>
+          </p:cNvSpPr>
+          <p:nvPr>
+            <p:ph type="sldImg"/>
+          </p:nvPr>
+        </p:nvSpPr>
+        <p:spPr/>
+      </p:sp>
+      <p:sp>
+        <p:nvSpPr>
+          <p:cNvPr id="3" name="備忘稿版面配置區 2"/>
+          <p:cNvSpPr>
+            <a:spLocks noGrp="1"/>
+          </p:cNvSpPr>
+          <p:nvPr>
+            <p:ph type="body" idx="1"/>
+          </p:nvPr>
+        </p:nvSpPr>
+        <p:spPr/>
+        <p:txBody>
+          <a:bodyPr/>
+          <a:lstStyle/>
+          <a:p>
+            <a:endParaRPr lang="zh-TW" altLang="en-US" dirty="0"/>
+          </a:p>
+        </p:txBody>
+      </p:sp>
+      <p:sp>
+        <p:nvSpPr>
+          <p:cNvPr id="4" name="投影片編號版面配置區 3"/>
+          <p:cNvSpPr>
+            <a:spLocks noGrp="1"/>
+          </p:cNvSpPr>
+          <p:nvPr>
+            <p:ph type="sldNum" sz="quarter" idx="5"/>
+          </p:nvPr>
+        </p:nvSpPr>
+        <p:spPr/>
+        <p:txBody>
+          <a:bodyPr/>
+          <a:lstStyle/>
+          <a:p>
+            <a:fld id="{6E3DB6C8-F213-43E3-857E-F7BDCA39C294}" type="slidenum">
+              <a:rPr lang="zh-TW" altLang="en-US" smtClean="0"/>
+              <a:t>1</a:t>
+            </a:fld>
+            <a:endParaRPr lang="zh-TW" altLang="en-US"/>
+          </a:p>
+        </p:txBody>
+      </p:sp>
+    </p:spTree>
+    <p:extLst>
+      <p:ext uri="{BB962C8B-B14F-4D97-AF65-F5344CB8AC3E}">
+        <p14:creationId xmlns:p14="http://schemas.microsoft.com/office/powerpoint/2010/main" val="4226009892"/>
+      </p:ext>
+    </p:extLst>
+  </p:cSld>
+  <p:clrMapOvr>
+    <a:masterClrMapping/>
+  </p:clrMapOvr>
+</p:notes>
+</file>
+
+<file path=ppt/notesSlides/notesSlide2.xml><?xml version="1.0" encoding="utf-8"?>
+<p:notes xmlns:a="http://schemas.openxmlformats.org/drawingml/2006/main" xmlns:r="http://schemas.openxmlformats.org/officeDocument/2006/relationships" xmlns:p="http://schemas.openxmlformats.org/presentationml/2006/main">
+  <p:cSld>
+    <p:spTree>
+      <p:nvGrpSpPr>
+        <p:cNvPr id="1" name=""/>
+        <p:cNvGrpSpPr/>
+        <p:nvPr/>
+      </p:nvGrpSpPr>
+      <p:grpSpPr>
+        <a:xfrm>
+          <a:off x="0" y="0"/>
+          <a:ext cx="0" cy="0"/>
+          <a:chOff x="0" y="0"/>
+          <a:chExt cx="0" cy="0"/>
+        </a:xfrm>
+      </p:grpSpPr>
+      <p:sp>
+        <p:nvSpPr>
+          <p:cNvPr id="2" name="投影片影像版面配置區 1"/>
+          <p:cNvSpPr>
+            <a:spLocks noGrp="1" noRot="1" noChangeAspect="1"/>
+          </p:cNvSpPr>
+          <p:nvPr>
+            <p:ph type="sldImg"/>
+          </p:nvPr>
+        </p:nvSpPr>
+        <p:spPr/>
+      </p:sp>
+      <p:sp>
+        <p:nvSpPr>
+          <p:cNvPr id="3" name="備忘稿版面配置區 2"/>
+          <p:cNvSpPr>
+            <a:spLocks noGrp="1"/>
+          </p:cNvSpPr>
+          <p:nvPr>
+            <p:ph type="body" idx="1"/>
+          </p:nvPr>
+        </p:nvSpPr>
+        <p:spPr/>
+        <p:txBody>
+          <a:bodyPr/>
+          <a:lstStyle/>
+          <a:p>
+            <a:r>
+              <a:rPr lang="en-US" altLang="zh-TW" b="1" i="0" dirty="0">
+                <a:solidFill>
+                  <a:srgbClr val="242424"/>
+                </a:solidFill>
+                <a:effectLst/>
+                <a:latin typeface="Segoe UI" panose="020B0502040204020203" pitchFamily="34" charset="0"/>
+              </a:rPr>
+              <a:t>A young anime-style girl with gray skin and short silver-gray hair, with two longer strands of hair hanging down to her chest. Her bangs partially cover one of her deep purple eyes, with no light spots in the pupils, creating an intense and mysterious gaze. She has elf-like ears. There is a purple gem on her chest. Her overall appearance exudes a melancholic and mysterious aura. She is wearing black Gothic-style clothes, with an oversized white sports coat, the zipper of the coat is only half-zipped, and she is wearing a black beret with ribbon decorations. She stands quietly in a dark corner of a grand and luxurious mansion, surrounded by Gothic architecture. The style should be more like a comic character, not too realistic, and the art style should be darker.</a:t>
+            </a:r>
+            <a:endParaRPr lang="zh-TW" altLang="en-US" dirty="0"/>
+          </a:p>
+        </p:txBody>
+      </p:sp>
+      <p:sp>
+        <p:nvSpPr>
+          <p:cNvPr id="4" name="投影片編號版面配置區 3"/>
+          <p:cNvSpPr>
+            <a:spLocks noGrp="1"/>
+          </p:cNvSpPr>
+          <p:nvPr>
+            <p:ph type="sldNum" sz="quarter" idx="5"/>
+          </p:nvPr>
+        </p:nvSpPr>
+        <p:spPr/>
+        <p:txBody>
+          <a:bodyPr/>
+          <a:lstStyle/>
+          <a:p>
+            <a:fld id="{6E3DB6C8-F213-43E3-857E-F7BDCA39C294}" type="slidenum">
+              <a:rPr lang="zh-TW" altLang="en-US" smtClean="0"/>
+              <a:t>2</a:t>
+            </a:fld>
+            <a:endParaRPr lang="zh-TW" altLang="en-US"/>
+          </a:p>
+        </p:txBody>
+      </p:sp>
+    </p:spTree>
+    <p:extLst>
+      <p:ext uri="{BB962C8B-B14F-4D97-AF65-F5344CB8AC3E}">
+        <p14:creationId xmlns:p14="http://schemas.microsoft.com/office/powerpoint/2010/main" val="1127428831"/>
+      </p:ext>
+    </p:extLst>
+  </p:cSld>
+  <p:clrMapOvr>
+    <a:masterClrMapping/>
+  </p:clrMapOvr>
+</p:notes>
+</file>
+
+<file path=ppt/notesSlides/notesSlide3.xml><?xml version="1.0" encoding="utf-8"?>
+<p:notes xmlns:a="http://schemas.openxmlformats.org/drawingml/2006/main" xmlns:r="http://schemas.openxmlformats.org/officeDocument/2006/relationships" xmlns:p="http://schemas.openxmlformats.org/presentationml/2006/main">
+  <p:cSld>
+    <p:spTree>
+      <p:nvGrpSpPr>
+        <p:cNvPr id="1" name=""/>
+        <p:cNvGrpSpPr/>
+        <p:nvPr/>
+      </p:nvGrpSpPr>
+      <p:grpSpPr>
+        <a:xfrm>
+          <a:off x="0" y="0"/>
+          <a:ext cx="0" cy="0"/>
+          <a:chOff x="0" y="0"/>
+          <a:chExt cx="0" cy="0"/>
+        </a:xfrm>
+      </p:grpSpPr>
+      <p:sp>
+        <p:nvSpPr>
+          <p:cNvPr id="2" name="投影片影像版面配置區 1"/>
+          <p:cNvSpPr>
+            <a:spLocks noGrp="1" noRot="1" noChangeAspect="1"/>
+          </p:cNvSpPr>
+          <p:nvPr>
+            <p:ph type="sldImg"/>
+          </p:nvPr>
+        </p:nvSpPr>
+        <p:spPr/>
+      </p:sp>
+      <p:sp>
+        <p:nvSpPr>
+          <p:cNvPr id="3" name="備忘稿版面配置區 2"/>
+          <p:cNvSpPr>
+            <a:spLocks noGrp="1"/>
+          </p:cNvSpPr>
+          <p:nvPr>
+            <p:ph type="body" idx="1"/>
+          </p:nvPr>
+        </p:nvSpPr>
+        <p:spPr/>
+        <p:txBody>
+          <a:bodyPr/>
+          <a:lstStyle/>
+          <a:p>
+            <a:r>
+              <a:rPr lang="en-US" altLang="zh-TW" b="1" i="0" dirty="0">
+                <a:solidFill>
+                  <a:srgbClr val="242424"/>
+                </a:solidFill>
+                <a:effectLst/>
+                <a:latin typeface="Segoe UI" panose="020B0502040204020203" pitchFamily="34" charset="0"/>
+              </a:rPr>
+              <a:t>A young anime-style girl with gray skin and short silver-gray hair, with two longer strands of hair hanging down to her chest. Her bangs partially cover one of her deep purple eyes, with no light spots in the pupils, creating an intense and mysterious gaze. Her entire skin is gray, with no flesh color. She has elf-like ears. There is a purple gem on her chest. Her overall appearance exudes a melancholic and mysterious aura. She is wearing black Gothic-style clothes, with an oversized white sports coat, the zipper of the coat is only half-zipped, and she is wearing a black beret with ribbon decorations. She looks very sad. There are a few people who look like maids next to her, pointing at her and discussing something, and the background is in a Gothic-style mansion. The camera is zoomed out a bit, and the main character should be drawn at least to the waist. The style should be more like a comic character, not too realistic, and the art style should be darker.</a:t>
+            </a:r>
+            <a:endParaRPr lang="zh-TW" altLang="en-US" dirty="0"/>
+          </a:p>
+        </p:txBody>
+      </p:sp>
+      <p:sp>
+        <p:nvSpPr>
+          <p:cNvPr id="4" name="投影片編號版面配置區 3"/>
+          <p:cNvSpPr>
+            <a:spLocks noGrp="1"/>
+          </p:cNvSpPr>
+          <p:nvPr>
+            <p:ph type="sldNum" sz="quarter" idx="5"/>
+          </p:nvPr>
+        </p:nvSpPr>
+        <p:spPr/>
+        <p:txBody>
+          <a:bodyPr/>
+          <a:lstStyle/>
+          <a:p>
+            <a:fld id="{6E3DB6C8-F213-43E3-857E-F7BDCA39C294}" type="slidenum">
+              <a:rPr lang="zh-TW" altLang="en-US" smtClean="0"/>
+              <a:t>3</a:t>
+            </a:fld>
+            <a:endParaRPr lang="zh-TW" altLang="en-US"/>
+          </a:p>
+        </p:txBody>
+      </p:sp>
+    </p:spTree>
+    <p:extLst>
+      <p:ext uri="{BB962C8B-B14F-4D97-AF65-F5344CB8AC3E}">
+        <p14:creationId xmlns:p14="http://schemas.microsoft.com/office/powerpoint/2010/main" val="1525745318"/>
+      </p:ext>
+    </p:extLst>
+  </p:cSld>
+  <p:clrMapOvr>
+    <a:masterClrMapping/>
+  </p:clrMapOvr>
+</p:notes>
+</file>
+
+<file path=ppt/notesSlides/notesSlide4.xml><?xml version="1.0" encoding="utf-8"?>
+<p:notes xmlns:a="http://schemas.openxmlformats.org/drawingml/2006/main" xmlns:r="http://schemas.openxmlformats.org/officeDocument/2006/relationships" xmlns:p="http://schemas.openxmlformats.org/presentationml/2006/main">
+  <p:cSld>
+    <p:spTree>
+      <p:nvGrpSpPr>
+        <p:cNvPr id="1" name=""/>
+        <p:cNvGrpSpPr/>
+        <p:nvPr/>
+      </p:nvGrpSpPr>
+      <p:grpSpPr>
+        <a:xfrm>
+          <a:off x="0" y="0"/>
+          <a:ext cx="0" cy="0"/>
+          <a:chOff x="0" y="0"/>
+          <a:chExt cx="0" cy="0"/>
+        </a:xfrm>
+      </p:grpSpPr>
+      <p:sp>
+        <p:nvSpPr>
+          <p:cNvPr id="2" name="投影片影像版面配置區 1"/>
+          <p:cNvSpPr>
+            <a:spLocks noGrp="1" noRot="1" noChangeAspect="1"/>
+          </p:cNvSpPr>
+          <p:nvPr>
+            <p:ph type="sldImg"/>
+          </p:nvPr>
+        </p:nvSpPr>
+        <p:spPr/>
+      </p:sp>
+      <p:sp>
+        <p:nvSpPr>
+          <p:cNvPr id="3" name="備忘稿版面配置區 2"/>
+          <p:cNvSpPr>
+            <a:spLocks noGrp="1"/>
+          </p:cNvSpPr>
+          <p:nvPr>
+            <p:ph type="body" idx="1"/>
+          </p:nvPr>
+        </p:nvSpPr>
+        <p:spPr/>
+        <p:txBody>
+          <a:bodyPr/>
+          <a:lstStyle/>
+          <a:p>
+            <a:r>
+              <a:rPr lang="en-US" altLang="zh-TW" b="1" i="0" dirty="0">
+                <a:solidFill>
+                  <a:srgbClr val="242424"/>
+                </a:solidFill>
+                <a:effectLst/>
+                <a:latin typeface="Segoe UI" panose="020B0502040204020203" pitchFamily="34" charset="0"/>
+              </a:rPr>
+              <a:t>A young anime-style girl with gray skin and short silver-gray hair, with two longer strands of hair hanging down to her chest. Her bangs partially cover one of her deep purple eyes, with no light spots in the pupils, creating an intense and mysterious gaze. Her entire skin is gray, with no flesh color. She has elf-like ears. There is a purple gem on her chest. Her overall appearance exudes a melancholic and mysterious aura. She is wearing black Gothic-style clothes, with an oversized white sports coat, the zipper of the coat is only half-zipped, and she is wearing a black beret with ribbon decorations. She is hiding behind a stone wall, holding a paper and pen, looking like she is recording something, with many papers in her hand. The style should be more like a comic character, not too realistic, and the art style should be darker.</a:t>
+            </a:r>
+            <a:endParaRPr lang="zh-TW" altLang="en-US" dirty="0"/>
+          </a:p>
+        </p:txBody>
+      </p:sp>
+      <p:sp>
+        <p:nvSpPr>
+          <p:cNvPr id="4" name="投影片編號版面配置區 3"/>
+          <p:cNvSpPr>
+            <a:spLocks noGrp="1"/>
+          </p:cNvSpPr>
+          <p:nvPr>
+            <p:ph type="sldNum" sz="quarter" idx="5"/>
+          </p:nvPr>
+        </p:nvSpPr>
+        <p:spPr/>
+        <p:txBody>
+          <a:bodyPr/>
+          <a:lstStyle/>
+          <a:p>
+            <a:fld id="{6E3DB6C8-F213-43E3-857E-F7BDCA39C294}" type="slidenum">
+              <a:rPr lang="zh-TW" altLang="en-US" smtClean="0"/>
+              <a:t>4</a:t>
+            </a:fld>
+            <a:endParaRPr lang="zh-TW" altLang="en-US"/>
+          </a:p>
+        </p:txBody>
+      </p:sp>
+    </p:spTree>
+    <p:extLst>
+      <p:ext uri="{BB962C8B-B14F-4D97-AF65-F5344CB8AC3E}">
+        <p14:creationId xmlns:p14="http://schemas.microsoft.com/office/powerpoint/2010/main" val="2277957039"/>
+      </p:ext>
+    </p:extLst>
+  </p:cSld>
+  <p:clrMapOvr>
+    <a:masterClrMapping/>
+  </p:clrMapOvr>
+</p:notes>
+</file>
+
+<file path=ppt/notesSlides/notesSlide5.xml><?xml version="1.0" encoding="utf-8"?>
+<p:notes xmlns:a="http://schemas.openxmlformats.org/drawingml/2006/main" xmlns:r="http://schemas.openxmlformats.org/officeDocument/2006/relationships" xmlns:p="http://schemas.openxmlformats.org/presentationml/2006/main">
+  <p:cSld>
+    <p:spTree>
+      <p:nvGrpSpPr>
+        <p:cNvPr id="1" name=""/>
+        <p:cNvGrpSpPr/>
+        <p:nvPr/>
+      </p:nvGrpSpPr>
+      <p:grpSpPr>
+        <a:xfrm>
+          <a:off x="0" y="0"/>
+          <a:ext cx="0" cy="0"/>
+          <a:chOff x="0" y="0"/>
+          <a:chExt cx="0" cy="0"/>
+        </a:xfrm>
+      </p:grpSpPr>
+      <p:sp>
+        <p:nvSpPr>
+          <p:cNvPr id="2" name="投影片影像版面配置區 1"/>
+          <p:cNvSpPr>
+            <a:spLocks noGrp="1" noRot="1" noChangeAspect="1"/>
+          </p:cNvSpPr>
+          <p:nvPr>
+            <p:ph type="sldImg"/>
+          </p:nvPr>
+        </p:nvSpPr>
+        <p:spPr/>
+      </p:sp>
+      <p:sp>
+        <p:nvSpPr>
+          <p:cNvPr id="3" name="備忘稿版面配置區 2"/>
+          <p:cNvSpPr>
+            <a:spLocks noGrp="1"/>
+          </p:cNvSpPr>
+          <p:nvPr>
+            <p:ph type="body" idx="1"/>
+          </p:nvPr>
+        </p:nvSpPr>
+        <p:spPr/>
+        <p:txBody>
+          <a:bodyPr/>
+          <a:lstStyle/>
+          <a:p>
+            <a:r>
+              <a:rPr lang="en-US" altLang="zh-TW" b="1" i="0" dirty="0">
+                <a:solidFill>
+                  <a:srgbClr val="242424"/>
+                </a:solidFill>
+                <a:effectLst/>
+                <a:latin typeface="Segoe UI" panose="020B0502040204020203" pitchFamily="34" charset="0"/>
+              </a:rPr>
+              <a:t>A young anime-style girl with a dark theme, gray skin, and silver-gray hair. The hair at the back of her head is short, with two strands much longer than the rest, hanging down to her chest. Her bangs cover one of her deep purple eyes, with no light spots in the pupils, creating an intense and mysterious gaze. Her entire skin is gray, with no flesh color. She has elf-like ears. There is a purple gem on her chest. Her overall appearance exudes a melancholic and mysterious aura. She is wearing black Gothic-style clothes and an oversized white sports jacket, with the zipper only halfway up, and a black beret with ribbon decorations. The background is a nighttime forest with rain, and the girl is running at full speed. The full body should be drawn, not just the upper body. Emphasize that she is wet and running. The style should not be too realistic, more like a manga character.</a:t>
+            </a:r>
+            <a:endParaRPr lang="zh-TW" altLang="en-US" dirty="0"/>
+          </a:p>
+        </p:txBody>
+      </p:sp>
+      <p:sp>
+        <p:nvSpPr>
+          <p:cNvPr id="4" name="投影片編號版面配置區 3"/>
+          <p:cNvSpPr>
+            <a:spLocks noGrp="1"/>
+          </p:cNvSpPr>
+          <p:nvPr>
+            <p:ph type="sldNum" sz="quarter" idx="5"/>
+          </p:nvPr>
+        </p:nvSpPr>
+        <p:spPr/>
+        <p:txBody>
+          <a:bodyPr/>
+          <a:lstStyle/>
+          <a:p>
+            <a:fld id="{6E3DB6C8-F213-43E3-857E-F7BDCA39C294}" type="slidenum">
+              <a:rPr lang="zh-TW" altLang="en-US" smtClean="0"/>
+              <a:t>5</a:t>
+            </a:fld>
+            <a:endParaRPr lang="zh-TW" altLang="en-US"/>
+          </a:p>
+        </p:txBody>
+      </p:sp>
+    </p:spTree>
+    <p:extLst>
+      <p:ext uri="{BB962C8B-B14F-4D97-AF65-F5344CB8AC3E}">
+        <p14:creationId xmlns:p14="http://schemas.microsoft.com/office/powerpoint/2010/main" val="3853955886"/>
+      </p:ext>
+    </p:extLst>
+  </p:cSld>
+  <p:clrMapOvr>
+    <a:masterClrMapping/>
+  </p:clrMapOvr>
+</p:notes>
+</file>
+
+<file path=ppt/notesSlides/notesSlide6.xml><?xml version="1.0" encoding="utf-8"?>
+<p:notes xmlns:a="http://schemas.openxmlformats.org/drawingml/2006/main" xmlns:r="http://schemas.openxmlformats.org/officeDocument/2006/relationships" xmlns:p="http://schemas.openxmlformats.org/presentationml/2006/main">
+  <p:cSld>
+    <p:spTree>
+      <p:nvGrpSpPr>
+        <p:cNvPr id="1" name=""/>
+        <p:cNvGrpSpPr/>
+        <p:nvPr/>
+      </p:nvGrpSpPr>
+      <p:grpSpPr>
+        <a:xfrm>
+          <a:off x="0" y="0"/>
+          <a:ext cx="0" cy="0"/>
+          <a:chOff x="0" y="0"/>
+          <a:chExt cx="0" cy="0"/>
+        </a:xfrm>
+      </p:grpSpPr>
+      <p:sp>
+        <p:nvSpPr>
+          <p:cNvPr id="2" name="投影片影像版面配置區 1"/>
+          <p:cNvSpPr>
+            <a:spLocks noGrp="1" noRot="1" noChangeAspect="1"/>
+          </p:cNvSpPr>
+          <p:nvPr>
+            <p:ph type="sldImg"/>
+          </p:nvPr>
+        </p:nvSpPr>
+        <p:spPr/>
+      </p:sp>
+      <p:sp>
+        <p:nvSpPr>
+          <p:cNvPr id="3" name="備忘稿版面配置區 2"/>
+          <p:cNvSpPr>
+            <a:spLocks noGrp="1"/>
+          </p:cNvSpPr>
+          <p:nvPr>
+            <p:ph type="body" idx="1"/>
+          </p:nvPr>
+        </p:nvSpPr>
+        <p:spPr/>
+        <p:txBody>
+          <a:bodyPr/>
+          <a:lstStyle/>
+          <a:p>
+            <a:r>
+              <a:rPr lang="en-US" altLang="zh-TW" b="1" i="0" dirty="0">
+                <a:solidFill>
+                  <a:srgbClr val="242424"/>
+                </a:solidFill>
+                <a:effectLst/>
+                <a:latin typeface="Segoe UI" panose="020B0502040204020203" pitchFamily="34" charset="0"/>
+              </a:rPr>
+              <a:t>A young girl in a dark-themed Japanese anime style, with gray skin and silver-gray hair. The hair at the back of her head is short, with two strands much longer than the rest, hanging down to her chest. Her bangs cover one of her deep purple eyes, with no light spots in the pupils, creating an intense and mysterious gaze. Her entire skin is gray, with no flesh color. She has elf-like ears. There is a purple gem on her chest. Her overall appearance exudes a melancholic and mysterious aura. She is wearing black Gothic clothing and an oversized white sports jacket, with the zipper only halfway up, and a black beret with ribbon decorations. The background is on the street, showing the protagonist hiding from people, nervously turning her head to look back. The style should not be too realistic, more like a manga character.</a:t>
+            </a:r>
+            <a:endParaRPr lang="zh-TW" altLang="en-US" dirty="0"/>
+          </a:p>
+        </p:txBody>
+      </p:sp>
+      <p:sp>
+        <p:nvSpPr>
+          <p:cNvPr id="4" name="投影片編號版面配置區 3"/>
+          <p:cNvSpPr>
+            <a:spLocks noGrp="1"/>
+          </p:cNvSpPr>
+          <p:nvPr>
+            <p:ph type="sldNum" sz="quarter" idx="5"/>
+          </p:nvPr>
+        </p:nvSpPr>
+        <p:spPr/>
+        <p:txBody>
+          <a:bodyPr/>
+          <a:lstStyle/>
+          <a:p>
+            <a:fld id="{6E3DB6C8-F213-43E3-857E-F7BDCA39C294}" type="slidenum">
+              <a:rPr lang="zh-TW" altLang="en-US" smtClean="0"/>
+              <a:t>6</a:t>
+            </a:fld>
+            <a:endParaRPr lang="zh-TW" altLang="en-US"/>
+          </a:p>
+        </p:txBody>
+      </p:sp>
+    </p:spTree>
+    <p:extLst>
+      <p:ext uri="{BB962C8B-B14F-4D97-AF65-F5344CB8AC3E}">
+        <p14:creationId xmlns:p14="http://schemas.microsoft.com/office/powerpoint/2010/main" val="86704021"/>
+      </p:ext>
+    </p:extLst>
+  </p:cSld>
+  <p:clrMapOvr>
+    <a:masterClrMapping/>
+  </p:clrMapOvr>
+</p:notes>
+</file>
+
+<file path=ppt/notesSlides/notesSlide7.xml><?xml version="1.0" encoding="utf-8"?>
+<p:notes xmlns:a="http://schemas.openxmlformats.org/drawingml/2006/main" xmlns:r="http://schemas.openxmlformats.org/officeDocument/2006/relationships" xmlns:p="http://schemas.openxmlformats.org/presentationml/2006/main">
+  <p:cSld>
+    <p:spTree>
+      <p:nvGrpSpPr>
+        <p:cNvPr id="1" name=""/>
+        <p:cNvGrpSpPr/>
+        <p:nvPr/>
+      </p:nvGrpSpPr>
+      <p:grpSpPr>
+        <a:xfrm>
+          <a:off x="0" y="0"/>
+          <a:ext cx="0" cy="0"/>
+          <a:chOff x="0" y="0"/>
+          <a:chExt cx="0" cy="0"/>
+        </a:xfrm>
+      </p:grpSpPr>
+      <p:sp>
+        <p:nvSpPr>
+          <p:cNvPr id="2" name="投影片影像版面配置區 1"/>
+          <p:cNvSpPr>
+            <a:spLocks noGrp="1" noRot="1" noChangeAspect="1"/>
+          </p:cNvSpPr>
+          <p:nvPr>
+            <p:ph type="sldImg"/>
+          </p:nvPr>
+        </p:nvSpPr>
+        <p:spPr/>
+      </p:sp>
+      <p:sp>
+        <p:nvSpPr>
+          <p:cNvPr id="3" name="備忘稿版面配置區 2"/>
+          <p:cNvSpPr>
+            <a:spLocks noGrp="1"/>
+          </p:cNvSpPr>
+          <p:nvPr>
+            <p:ph type="body" idx="1"/>
+          </p:nvPr>
+        </p:nvSpPr>
+        <p:spPr/>
+        <p:txBody>
+          <a:bodyPr/>
+          <a:lstStyle/>
+          <a:p>
+            <a:r>
+              <a:rPr lang="en-US" altLang="zh-TW" b="1" i="0" dirty="0">
+                <a:solidFill>
+                  <a:srgbClr val="242424"/>
+                </a:solidFill>
+                <a:effectLst/>
+                <a:latin typeface="Segoe UI" panose="020B0502040204020203" pitchFamily="34" charset="0"/>
+              </a:rPr>
+              <a:t>A young girl in a dark-themed Japanese anime style, with gray skin and silver-gray hair. The hair at the back of her head is short, with two strands much longer than the rest, hanging down to her chest. Her bangs cover one of her deep purple eyes, with no light spots in the pupils, creating an intense and mysterious gaze. Her entire skin is gray, with no flesh color. She has elf-like ears. There is a purple gem on her chest. Her overall appearance exudes a melancholic and mysterious aura. She is wearing black Gothic clothing and an oversized white sports jacket, with the zipper only halfway up, and a black beret with ribbon decorations. The background is on the street, showing the protagonist running with a smug expression. Emphasize the running on the street, draw a full-body picture, and show the feet running. The style should not be too realistic, more like a manga character.</a:t>
+            </a:r>
+            <a:endParaRPr lang="zh-TW" altLang="en-US" dirty="0"/>
+          </a:p>
+        </p:txBody>
+      </p:sp>
+      <p:sp>
+        <p:nvSpPr>
+          <p:cNvPr id="4" name="投影片編號版面配置區 3"/>
+          <p:cNvSpPr>
+            <a:spLocks noGrp="1"/>
+          </p:cNvSpPr>
+          <p:nvPr>
+            <p:ph type="sldNum" sz="quarter" idx="5"/>
+          </p:nvPr>
+        </p:nvSpPr>
+        <p:spPr/>
+        <p:txBody>
+          <a:bodyPr/>
+          <a:lstStyle/>
+          <a:p>
+            <a:fld id="{6E3DB6C8-F213-43E3-857E-F7BDCA39C294}" type="slidenum">
+              <a:rPr lang="zh-TW" altLang="en-US" smtClean="0"/>
+              <a:t>7</a:t>
+            </a:fld>
+            <a:endParaRPr lang="zh-TW" altLang="en-US"/>
+          </a:p>
+        </p:txBody>
+      </p:sp>
+    </p:spTree>
+    <p:extLst>
+      <p:ext uri="{BB962C8B-B14F-4D97-AF65-F5344CB8AC3E}">
+        <p14:creationId xmlns:p14="http://schemas.microsoft.com/office/powerpoint/2010/main" val="624272787"/>
+      </p:ext>
+    </p:extLst>
+  </p:cSld>
+  <p:clrMapOvr>
+    <a:masterClrMapping/>
+  </p:clrMapOvr>
+</p:notes>
+</file>
+
+<file path=ppt/notesSlides/notesSlide8.xml><?xml version="1.0" encoding="utf-8"?>
+<p:notes xmlns:a="http://schemas.openxmlformats.org/drawingml/2006/main" xmlns:r="http://schemas.openxmlformats.org/officeDocument/2006/relationships" xmlns:p="http://schemas.openxmlformats.org/presentationml/2006/main">
+  <p:cSld>
+    <p:spTree>
+      <p:nvGrpSpPr>
+        <p:cNvPr id="1" name=""/>
+        <p:cNvGrpSpPr/>
+        <p:nvPr/>
+      </p:nvGrpSpPr>
+      <p:grpSpPr>
+        <a:xfrm>
+          <a:off x="0" y="0"/>
+          <a:ext cx="0" cy="0"/>
+          <a:chOff x="0" y="0"/>
+          <a:chExt cx="0" cy="0"/>
+        </a:xfrm>
+      </p:grpSpPr>
+      <p:sp>
+        <p:nvSpPr>
+          <p:cNvPr id="2" name="投影片影像版面配置區 1"/>
+          <p:cNvSpPr>
+            <a:spLocks noGrp="1" noRot="1" noChangeAspect="1"/>
+          </p:cNvSpPr>
+          <p:nvPr>
+            <p:ph type="sldImg"/>
+          </p:nvPr>
+        </p:nvSpPr>
+        <p:spPr/>
+      </p:sp>
+      <p:sp>
+        <p:nvSpPr>
+          <p:cNvPr id="3" name="備忘稿版面配置區 2"/>
+          <p:cNvSpPr>
+            <a:spLocks noGrp="1"/>
+          </p:cNvSpPr>
+          <p:nvPr>
+            <p:ph type="body" idx="1"/>
+          </p:nvPr>
+        </p:nvSpPr>
+        <p:spPr/>
+        <p:txBody>
+          <a:bodyPr/>
+          <a:lstStyle/>
+          <a:p>
+            <a:r>
+              <a:rPr lang="en-US" altLang="zh-TW" b="1" i="0" dirty="0">
+                <a:solidFill>
+                  <a:srgbClr val="242424"/>
+                </a:solidFill>
+                <a:effectLst/>
+                <a:latin typeface="Segoe UI" panose="020B0502040204020203" pitchFamily="34" charset="0"/>
+              </a:rPr>
+              <a:t>A young girl in a dark-themed Japanese anime style, with gray skin and silver-gray hair. The hair at the back of her head is short, with two strands much longer than the rest, hanging down to her chest. Her bangs cover one of her deep purple eyes, with no light spots in the pupils, creating an intense and mysterious gaze. Her entire skin is gray, with no flesh color. She has elf-like ears. There is a purple gem on her chest. Her overall appearance exudes a melancholic and mysterious aura. She is wearing black Gothic clothing and a white oversized sports jacket, with the zipper only halfway up, and a black beret with ribbon decorations. The background is in a dark-themed room, with the protagonist's hands on the table (in a pose like an interviewer thinking, with both elbows on the table and fingers interlocked), smiling at the camera. The drawing should not be too realistic, more like a comic character.</a:t>
+            </a:r>
+            <a:endParaRPr lang="zh-TW" altLang="en-US" dirty="0"/>
+          </a:p>
+        </p:txBody>
+      </p:sp>
+      <p:sp>
+        <p:nvSpPr>
+          <p:cNvPr id="4" name="投影片編號版面配置區 3"/>
+          <p:cNvSpPr>
+            <a:spLocks noGrp="1"/>
+          </p:cNvSpPr>
+          <p:nvPr>
+            <p:ph type="sldNum" sz="quarter" idx="5"/>
+          </p:nvPr>
+        </p:nvSpPr>
+        <p:spPr/>
+        <p:txBody>
+          <a:bodyPr/>
+          <a:lstStyle/>
+          <a:p>
+            <a:fld id="{6E3DB6C8-F213-43E3-857E-F7BDCA39C294}" type="slidenum">
+              <a:rPr lang="zh-TW" altLang="en-US" smtClean="0"/>
+              <a:t>8</a:t>
+            </a:fld>
+            <a:endParaRPr lang="zh-TW" altLang="en-US"/>
+          </a:p>
+        </p:txBody>
+      </p:sp>
+    </p:spTree>
+    <p:extLst>
+      <p:ext uri="{BB962C8B-B14F-4D97-AF65-F5344CB8AC3E}">
+        <p14:creationId xmlns:p14="http://schemas.microsoft.com/office/powerpoint/2010/main" val="69567164"/>
+      </p:ext>
+    </p:extLst>
+  </p:cSld>
+  <p:clrMapOvr>
+    <a:masterClrMapping/>
+  </p:clrMapOvr>
+</p:notes>
 </file>
 
 <file path=ppt/slideLayouts/slideLayout1.xml><?xml version="1.0" encoding="utf-8"?>
@@ -129,7 +1235,7 @@
           <p:cNvPr id="2" name="標題 1">
             <a:extLst>
               <a:ext uri="{FF2B5EF4-FFF2-40B4-BE49-F238E27FC236}">
-                <a16:creationId xmlns:a16="http://schemas.microsoft.com/office/drawing/2014/main" id="{EB5CC918-B447-434E-B98E-5847BB49C259}"/>
+                <a16:creationId xmlns:a16="http://schemas.microsoft.com/office/drawing/2014/main" id="{9A82033A-A5B6-11DF-7CF3-C5CAB6CE782C}"/>
               </a:ext>
             </a:extLst>
           </p:cNvPr>
@@ -166,7 +1272,7 @@
           <p:cNvPr id="3" name="副標題 2">
             <a:extLst>
               <a:ext uri="{FF2B5EF4-FFF2-40B4-BE49-F238E27FC236}">
-                <a16:creationId xmlns:a16="http://schemas.microsoft.com/office/drawing/2014/main" id="{817FCC70-CC4E-4CB6-B2CF-9FDA5AC4D346}"/>
+                <a16:creationId xmlns:a16="http://schemas.microsoft.com/office/drawing/2014/main" id="{34A4B1ED-8DAD-32F6-83F1-F4D3DB522603}"/>
               </a:ext>
             </a:extLst>
           </p:cNvPr>
@@ -236,7 +1342,7 @@
           <p:cNvPr id="4" name="日期版面配置區 3">
             <a:extLst>
               <a:ext uri="{FF2B5EF4-FFF2-40B4-BE49-F238E27FC236}">
-                <a16:creationId xmlns:a16="http://schemas.microsoft.com/office/drawing/2014/main" id="{BD08F018-0004-4322-AD0F-E6E740964233}"/>
+                <a16:creationId xmlns:a16="http://schemas.microsoft.com/office/drawing/2014/main" id="{438A174B-C124-3A58-DBB8-A1840771B5CB}"/>
               </a:ext>
             </a:extLst>
           </p:cNvPr>
@@ -252,9 +1358,9 @@
           <a:bodyPr/>
           <a:lstStyle/>
           <a:p>
-            <a:fld id="{C3C90D7E-32D6-4894-AE08-7BBB3E610FC9}" type="datetimeFigureOut">
+            <a:fld id="{458E591F-1D90-4A08-BEBB-9552D45ACD8D}" type="datetimeFigureOut">
               <a:rPr lang="zh-TW" altLang="en-US" smtClean="0"/>
-              <a:t>2024/9/16</a:t>
+              <a:t>2024/10/26</a:t>
             </a:fld>
             <a:endParaRPr lang="zh-TW" altLang="en-US"/>
           </a:p>
@@ -265,7 +1371,7 @@
           <p:cNvPr id="5" name="頁尾版面配置區 4">
             <a:extLst>
               <a:ext uri="{FF2B5EF4-FFF2-40B4-BE49-F238E27FC236}">
-                <a16:creationId xmlns:a16="http://schemas.microsoft.com/office/drawing/2014/main" id="{30427B34-CB13-41C7-B2F2-CED9BDC5B595}"/>
+                <a16:creationId xmlns:a16="http://schemas.microsoft.com/office/drawing/2014/main" id="{43B844DD-0013-70B8-1AB3-0DD5DB74A5C8}"/>
               </a:ext>
             </a:extLst>
           </p:cNvPr>
@@ -290,7 +1396,7 @@
           <p:cNvPr id="6" name="投影片編號版面配置區 5">
             <a:extLst>
               <a:ext uri="{FF2B5EF4-FFF2-40B4-BE49-F238E27FC236}">
-                <a16:creationId xmlns:a16="http://schemas.microsoft.com/office/drawing/2014/main" id="{76FA962E-5B03-439A-928C-87366876542D}"/>
+                <a16:creationId xmlns:a16="http://schemas.microsoft.com/office/drawing/2014/main" id="{13F1365B-AF31-F91C-1F15-F144CA22DE30}"/>
               </a:ext>
             </a:extLst>
           </p:cNvPr>
@@ -306,7 +1412,7 @@
           <a:bodyPr/>
           <a:lstStyle/>
           <a:p>
-            <a:fld id="{E31EC408-072F-4346-BD0A-D6AA5788A305}" type="slidenum">
+            <a:fld id="{9B3887EC-0C89-4BEA-9AE1-52834055F7A5}" type="slidenum">
               <a:rPr lang="zh-TW" altLang="en-US" smtClean="0"/>
               <a:t>‹#›</a:t>
             </a:fld>
@@ -317,7 +1423,7 @@
     </p:spTree>
     <p:extLst>
       <p:ext uri="{BB962C8B-B14F-4D97-AF65-F5344CB8AC3E}">
-        <p14:creationId xmlns:p14="http://schemas.microsoft.com/office/powerpoint/2010/main" val="2963035110"/>
+        <p14:creationId xmlns:p14="http://schemas.microsoft.com/office/powerpoint/2010/main" val="3770610259"/>
       </p:ext>
     </p:extLst>
   </p:cSld>
@@ -349,7 +1455,7 @@
           <p:cNvPr id="2" name="標題 1">
             <a:extLst>
               <a:ext uri="{FF2B5EF4-FFF2-40B4-BE49-F238E27FC236}">
-                <a16:creationId xmlns:a16="http://schemas.microsoft.com/office/drawing/2014/main" id="{A02F0018-7F8E-4206-A929-07CDC6B5F34A}"/>
+                <a16:creationId xmlns:a16="http://schemas.microsoft.com/office/drawing/2014/main" id="{D5ED1B84-52AA-77D4-880B-660A51195D34}"/>
               </a:ext>
             </a:extLst>
           </p:cNvPr>
@@ -377,7 +1483,7 @@
           <p:cNvPr id="3" name="直排文字版面配置區 2">
             <a:extLst>
               <a:ext uri="{FF2B5EF4-FFF2-40B4-BE49-F238E27FC236}">
-                <a16:creationId xmlns:a16="http://schemas.microsoft.com/office/drawing/2014/main" id="{9B801E88-34C3-4545-A358-81F5614FED64}"/>
+                <a16:creationId xmlns:a16="http://schemas.microsoft.com/office/drawing/2014/main" id="{950636C2-EF57-17FD-B3DD-2660477A03DF}"/>
               </a:ext>
             </a:extLst>
           </p:cNvPr>
@@ -434,7 +1540,7 @@
           <p:cNvPr id="4" name="日期版面配置區 3">
             <a:extLst>
               <a:ext uri="{FF2B5EF4-FFF2-40B4-BE49-F238E27FC236}">
-                <a16:creationId xmlns:a16="http://schemas.microsoft.com/office/drawing/2014/main" id="{60AFD716-8B99-4230-B55F-C8B88ECBB171}"/>
+                <a16:creationId xmlns:a16="http://schemas.microsoft.com/office/drawing/2014/main" id="{FFB51614-AEB1-99AB-FC82-FF4D2F3549B4}"/>
               </a:ext>
             </a:extLst>
           </p:cNvPr>
@@ -450,9 +1556,9 @@
           <a:bodyPr/>
           <a:lstStyle/>
           <a:p>
-            <a:fld id="{C3C90D7E-32D6-4894-AE08-7BBB3E610FC9}" type="datetimeFigureOut">
+            <a:fld id="{458E591F-1D90-4A08-BEBB-9552D45ACD8D}" type="datetimeFigureOut">
               <a:rPr lang="zh-TW" altLang="en-US" smtClean="0"/>
-              <a:t>2024/9/16</a:t>
+              <a:t>2024/10/26</a:t>
             </a:fld>
             <a:endParaRPr lang="zh-TW" altLang="en-US"/>
           </a:p>
@@ -463,7 +1569,7 @@
           <p:cNvPr id="5" name="頁尾版面配置區 4">
             <a:extLst>
               <a:ext uri="{FF2B5EF4-FFF2-40B4-BE49-F238E27FC236}">
-                <a16:creationId xmlns:a16="http://schemas.microsoft.com/office/drawing/2014/main" id="{EA374743-76D9-4BF8-A60C-2F50B2636A8A}"/>
+                <a16:creationId xmlns:a16="http://schemas.microsoft.com/office/drawing/2014/main" id="{DBC291AD-ECF3-41A8-B7B4-CADCFE1F0ECC}"/>
               </a:ext>
             </a:extLst>
           </p:cNvPr>
@@ -488,7 +1594,7 @@
           <p:cNvPr id="6" name="投影片編號版面配置區 5">
             <a:extLst>
               <a:ext uri="{FF2B5EF4-FFF2-40B4-BE49-F238E27FC236}">
-                <a16:creationId xmlns:a16="http://schemas.microsoft.com/office/drawing/2014/main" id="{00454594-6C11-4013-A666-A151E960EC9B}"/>
+                <a16:creationId xmlns:a16="http://schemas.microsoft.com/office/drawing/2014/main" id="{9E041B26-18DE-A8DB-D2B4-83DF86F6DC7A}"/>
               </a:ext>
             </a:extLst>
           </p:cNvPr>
@@ -504,7 +1610,7 @@
           <a:bodyPr/>
           <a:lstStyle/>
           <a:p>
-            <a:fld id="{E31EC408-072F-4346-BD0A-D6AA5788A305}" type="slidenum">
+            <a:fld id="{9B3887EC-0C89-4BEA-9AE1-52834055F7A5}" type="slidenum">
               <a:rPr lang="zh-TW" altLang="en-US" smtClean="0"/>
               <a:t>‹#›</a:t>
             </a:fld>
@@ -515,7 +1621,7 @@
     </p:spTree>
     <p:extLst>
       <p:ext uri="{BB962C8B-B14F-4D97-AF65-F5344CB8AC3E}">
-        <p14:creationId xmlns:p14="http://schemas.microsoft.com/office/powerpoint/2010/main" val="188953001"/>
+        <p14:creationId xmlns:p14="http://schemas.microsoft.com/office/powerpoint/2010/main" val="2096744003"/>
       </p:ext>
     </p:extLst>
   </p:cSld>
@@ -547,7 +1653,7 @@
           <p:cNvPr id="2" name="直排標題 1">
             <a:extLst>
               <a:ext uri="{FF2B5EF4-FFF2-40B4-BE49-F238E27FC236}">
-                <a16:creationId xmlns:a16="http://schemas.microsoft.com/office/drawing/2014/main" id="{70F760AC-E708-4605-85E2-7D0F424B3E29}"/>
+                <a16:creationId xmlns:a16="http://schemas.microsoft.com/office/drawing/2014/main" id="{A92437F2-0ADF-3939-01E8-B604588DBD9D}"/>
               </a:ext>
             </a:extLst>
           </p:cNvPr>
@@ -580,7 +1686,7 @@
           <p:cNvPr id="3" name="直排文字版面配置區 2">
             <a:extLst>
               <a:ext uri="{FF2B5EF4-FFF2-40B4-BE49-F238E27FC236}">
-                <a16:creationId xmlns:a16="http://schemas.microsoft.com/office/drawing/2014/main" id="{84BECF48-F3B6-4D47-82A8-C6AE92EDC2F0}"/>
+                <a16:creationId xmlns:a16="http://schemas.microsoft.com/office/drawing/2014/main" id="{F0AACD98-EFBD-EC3D-41D4-13E0E725A24B}"/>
               </a:ext>
             </a:extLst>
           </p:cNvPr>
@@ -642,7 +1748,7 @@
           <p:cNvPr id="4" name="日期版面配置區 3">
             <a:extLst>
               <a:ext uri="{FF2B5EF4-FFF2-40B4-BE49-F238E27FC236}">
-                <a16:creationId xmlns:a16="http://schemas.microsoft.com/office/drawing/2014/main" id="{215DE52A-093E-4116-A2FE-F61BA999B89F}"/>
+                <a16:creationId xmlns:a16="http://schemas.microsoft.com/office/drawing/2014/main" id="{2394D3C1-C3DE-D4A2-8823-2231AD4854DC}"/>
               </a:ext>
             </a:extLst>
           </p:cNvPr>
@@ -658,9 +1764,9 @@
           <a:bodyPr/>
           <a:lstStyle/>
           <a:p>
-            <a:fld id="{C3C90D7E-32D6-4894-AE08-7BBB3E610FC9}" type="datetimeFigureOut">
+            <a:fld id="{458E591F-1D90-4A08-BEBB-9552D45ACD8D}" type="datetimeFigureOut">
               <a:rPr lang="zh-TW" altLang="en-US" smtClean="0"/>
-              <a:t>2024/9/16</a:t>
+              <a:t>2024/10/26</a:t>
             </a:fld>
             <a:endParaRPr lang="zh-TW" altLang="en-US"/>
           </a:p>
@@ -671,7 +1777,7 @@
           <p:cNvPr id="5" name="頁尾版面配置區 4">
             <a:extLst>
               <a:ext uri="{FF2B5EF4-FFF2-40B4-BE49-F238E27FC236}">
-                <a16:creationId xmlns:a16="http://schemas.microsoft.com/office/drawing/2014/main" id="{34553FE1-A5D9-4070-AA9C-378F491D4677}"/>
+                <a16:creationId xmlns:a16="http://schemas.microsoft.com/office/drawing/2014/main" id="{92BC1AA6-C12C-5D5C-0B01-B77127E6AE3D}"/>
               </a:ext>
             </a:extLst>
           </p:cNvPr>
@@ -696,7 +1802,7 @@
           <p:cNvPr id="6" name="投影片編號版面配置區 5">
             <a:extLst>
               <a:ext uri="{FF2B5EF4-FFF2-40B4-BE49-F238E27FC236}">
-                <a16:creationId xmlns:a16="http://schemas.microsoft.com/office/drawing/2014/main" id="{928EFDDC-5B11-4543-8144-518625EDA57F}"/>
+                <a16:creationId xmlns:a16="http://schemas.microsoft.com/office/drawing/2014/main" id="{ECAC8E24-F4AC-FFEF-935D-BB59180F91B6}"/>
               </a:ext>
             </a:extLst>
           </p:cNvPr>
@@ -712,7 +1818,7 @@
           <a:bodyPr/>
           <a:lstStyle/>
           <a:p>
-            <a:fld id="{E31EC408-072F-4346-BD0A-D6AA5788A305}" type="slidenum">
+            <a:fld id="{9B3887EC-0C89-4BEA-9AE1-52834055F7A5}" type="slidenum">
               <a:rPr lang="zh-TW" altLang="en-US" smtClean="0"/>
               <a:t>‹#›</a:t>
             </a:fld>
@@ -723,7 +1829,7 @@
     </p:spTree>
     <p:extLst>
       <p:ext uri="{BB962C8B-B14F-4D97-AF65-F5344CB8AC3E}">
-        <p14:creationId xmlns:p14="http://schemas.microsoft.com/office/powerpoint/2010/main" val="2483123943"/>
+        <p14:creationId xmlns:p14="http://schemas.microsoft.com/office/powerpoint/2010/main" val="637927967"/>
       </p:ext>
     </p:extLst>
   </p:cSld>
@@ -755,7 +1861,7 @@
           <p:cNvPr id="2" name="標題 1">
             <a:extLst>
               <a:ext uri="{FF2B5EF4-FFF2-40B4-BE49-F238E27FC236}">
-                <a16:creationId xmlns:a16="http://schemas.microsoft.com/office/drawing/2014/main" id="{A1BFCF4C-FB58-444C-B754-A594851E4C7B}"/>
+                <a16:creationId xmlns:a16="http://schemas.microsoft.com/office/drawing/2014/main" id="{C05D7F5D-0ADB-B1D2-CB6D-CAB345E052D1}"/>
               </a:ext>
             </a:extLst>
           </p:cNvPr>
@@ -783,7 +1889,7 @@
           <p:cNvPr id="3" name="內容版面配置區 2">
             <a:extLst>
               <a:ext uri="{FF2B5EF4-FFF2-40B4-BE49-F238E27FC236}">
-                <a16:creationId xmlns:a16="http://schemas.microsoft.com/office/drawing/2014/main" id="{987C475D-648F-4511-A6FE-04B04F755F93}"/>
+                <a16:creationId xmlns:a16="http://schemas.microsoft.com/office/drawing/2014/main" id="{4B40D6F0-E305-82EB-0890-829F96670CFA}"/>
               </a:ext>
             </a:extLst>
           </p:cNvPr>
@@ -840,7 +1946,7 @@
           <p:cNvPr id="4" name="日期版面配置區 3">
             <a:extLst>
               <a:ext uri="{FF2B5EF4-FFF2-40B4-BE49-F238E27FC236}">
-                <a16:creationId xmlns:a16="http://schemas.microsoft.com/office/drawing/2014/main" id="{F511FCF8-D8F7-4914-920F-D63F2D97F713}"/>
+                <a16:creationId xmlns:a16="http://schemas.microsoft.com/office/drawing/2014/main" id="{46020A19-8539-4E39-AF14-AF8D232B4AD2}"/>
               </a:ext>
             </a:extLst>
           </p:cNvPr>
@@ -856,9 +1962,9 @@
           <a:bodyPr/>
           <a:lstStyle/>
           <a:p>
-            <a:fld id="{C3C90D7E-32D6-4894-AE08-7BBB3E610FC9}" type="datetimeFigureOut">
+            <a:fld id="{458E591F-1D90-4A08-BEBB-9552D45ACD8D}" type="datetimeFigureOut">
               <a:rPr lang="zh-TW" altLang="en-US" smtClean="0"/>
-              <a:t>2024/9/16</a:t>
+              <a:t>2024/10/26</a:t>
             </a:fld>
             <a:endParaRPr lang="zh-TW" altLang="en-US"/>
           </a:p>
@@ -869,7 +1975,7 @@
           <p:cNvPr id="5" name="頁尾版面配置區 4">
             <a:extLst>
               <a:ext uri="{FF2B5EF4-FFF2-40B4-BE49-F238E27FC236}">
-                <a16:creationId xmlns:a16="http://schemas.microsoft.com/office/drawing/2014/main" id="{7E1D3E8F-338D-4B4D-B411-5282866FF95D}"/>
+                <a16:creationId xmlns:a16="http://schemas.microsoft.com/office/drawing/2014/main" id="{23F68F80-93D8-FC06-423F-3043DD3BFFDA}"/>
               </a:ext>
             </a:extLst>
           </p:cNvPr>
@@ -894,7 +2000,7 @@
           <p:cNvPr id="6" name="投影片編號版面配置區 5">
             <a:extLst>
               <a:ext uri="{FF2B5EF4-FFF2-40B4-BE49-F238E27FC236}">
-                <a16:creationId xmlns:a16="http://schemas.microsoft.com/office/drawing/2014/main" id="{F7DF3AD5-06B6-42D8-AEDF-66CCE6582524}"/>
+                <a16:creationId xmlns:a16="http://schemas.microsoft.com/office/drawing/2014/main" id="{FB05AF08-E524-40A6-5B98-13B4BB8DA404}"/>
               </a:ext>
             </a:extLst>
           </p:cNvPr>
@@ -910,7 +2016,7 @@
           <a:bodyPr/>
           <a:lstStyle/>
           <a:p>
-            <a:fld id="{E31EC408-072F-4346-BD0A-D6AA5788A305}" type="slidenum">
+            <a:fld id="{9B3887EC-0C89-4BEA-9AE1-52834055F7A5}" type="slidenum">
               <a:rPr lang="zh-TW" altLang="en-US" smtClean="0"/>
               <a:t>‹#›</a:t>
             </a:fld>
@@ -921,7 +2027,7 @@
     </p:spTree>
     <p:extLst>
       <p:ext uri="{BB962C8B-B14F-4D97-AF65-F5344CB8AC3E}">
-        <p14:creationId xmlns:p14="http://schemas.microsoft.com/office/powerpoint/2010/main" val="4198509733"/>
+        <p14:creationId xmlns:p14="http://schemas.microsoft.com/office/powerpoint/2010/main" val="2745784277"/>
       </p:ext>
     </p:extLst>
   </p:cSld>
@@ -953,7 +2059,7 @@
           <p:cNvPr id="2" name="標題 1">
             <a:extLst>
               <a:ext uri="{FF2B5EF4-FFF2-40B4-BE49-F238E27FC236}">
-                <a16:creationId xmlns:a16="http://schemas.microsoft.com/office/drawing/2014/main" id="{5986B870-2B24-4658-9AEB-3C92E8E40B41}"/>
+                <a16:creationId xmlns:a16="http://schemas.microsoft.com/office/drawing/2014/main" id="{39F1F42F-1123-CFB3-25AD-6C5CD6FB3371}"/>
               </a:ext>
             </a:extLst>
           </p:cNvPr>
@@ -990,7 +2096,7 @@
           <p:cNvPr id="3" name="文字版面配置區 2">
             <a:extLst>
               <a:ext uri="{FF2B5EF4-FFF2-40B4-BE49-F238E27FC236}">
-                <a16:creationId xmlns:a16="http://schemas.microsoft.com/office/drawing/2014/main" id="{90235018-E757-4630-8511-F466B919268F}"/>
+                <a16:creationId xmlns:a16="http://schemas.microsoft.com/office/drawing/2014/main" id="{4289886A-3059-4061-FC86-35F54E768F42}"/>
               </a:ext>
             </a:extLst>
           </p:cNvPr>
@@ -1115,7 +2221,7 @@
           <p:cNvPr id="4" name="日期版面配置區 3">
             <a:extLst>
               <a:ext uri="{FF2B5EF4-FFF2-40B4-BE49-F238E27FC236}">
-                <a16:creationId xmlns:a16="http://schemas.microsoft.com/office/drawing/2014/main" id="{37546C76-CF19-433D-9070-0A54A149F1B2}"/>
+                <a16:creationId xmlns:a16="http://schemas.microsoft.com/office/drawing/2014/main" id="{FF3E6055-9973-F3FD-DB6C-80D66E05116F}"/>
               </a:ext>
             </a:extLst>
           </p:cNvPr>
@@ -1131,9 +2237,9 @@
           <a:bodyPr/>
           <a:lstStyle/>
           <a:p>
-            <a:fld id="{C3C90D7E-32D6-4894-AE08-7BBB3E610FC9}" type="datetimeFigureOut">
+            <a:fld id="{458E591F-1D90-4A08-BEBB-9552D45ACD8D}" type="datetimeFigureOut">
               <a:rPr lang="zh-TW" altLang="en-US" smtClean="0"/>
-              <a:t>2024/9/16</a:t>
+              <a:t>2024/10/26</a:t>
             </a:fld>
             <a:endParaRPr lang="zh-TW" altLang="en-US"/>
           </a:p>
@@ -1144,7 +2250,7 @@
           <p:cNvPr id="5" name="頁尾版面配置區 4">
             <a:extLst>
               <a:ext uri="{FF2B5EF4-FFF2-40B4-BE49-F238E27FC236}">
-                <a16:creationId xmlns:a16="http://schemas.microsoft.com/office/drawing/2014/main" id="{9C9DC25F-827C-4564-AD0E-7FD815D53AF7}"/>
+                <a16:creationId xmlns:a16="http://schemas.microsoft.com/office/drawing/2014/main" id="{F792EAFC-DE58-1918-5F30-32BB98CA47F0}"/>
               </a:ext>
             </a:extLst>
           </p:cNvPr>
@@ -1169,7 +2275,7 @@
           <p:cNvPr id="6" name="投影片編號版面配置區 5">
             <a:extLst>
               <a:ext uri="{FF2B5EF4-FFF2-40B4-BE49-F238E27FC236}">
-                <a16:creationId xmlns:a16="http://schemas.microsoft.com/office/drawing/2014/main" id="{8C0653A6-68AA-4213-8D62-EAF9243D6998}"/>
+                <a16:creationId xmlns:a16="http://schemas.microsoft.com/office/drawing/2014/main" id="{C14DED4B-C3E2-7352-8314-BDD7CE526987}"/>
               </a:ext>
             </a:extLst>
           </p:cNvPr>
@@ -1185,7 +2291,7 @@
           <a:bodyPr/>
           <a:lstStyle/>
           <a:p>
-            <a:fld id="{E31EC408-072F-4346-BD0A-D6AA5788A305}" type="slidenum">
+            <a:fld id="{9B3887EC-0C89-4BEA-9AE1-52834055F7A5}" type="slidenum">
               <a:rPr lang="zh-TW" altLang="en-US" smtClean="0"/>
               <a:t>‹#›</a:t>
             </a:fld>
@@ -1196,7 +2302,7 @@
     </p:spTree>
     <p:extLst>
       <p:ext uri="{BB962C8B-B14F-4D97-AF65-F5344CB8AC3E}">
-        <p14:creationId xmlns:p14="http://schemas.microsoft.com/office/powerpoint/2010/main" val="3126775509"/>
+        <p14:creationId xmlns:p14="http://schemas.microsoft.com/office/powerpoint/2010/main" val="3337625405"/>
       </p:ext>
     </p:extLst>
   </p:cSld>
@@ -1228,7 +2334,7 @@
           <p:cNvPr id="2" name="標題 1">
             <a:extLst>
               <a:ext uri="{FF2B5EF4-FFF2-40B4-BE49-F238E27FC236}">
-                <a16:creationId xmlns:a16="http://schemas.microsoft.com/office/drawing/2014/main" id="{F8A74D77-9E6E-4FD1-97AD-0ADC1228B6AF}"/>
+                <a16:creationId xmlns:a16="http://schemas.microsoft.com/office/drawing/2014/main" id="{B9023FC0-3C30-7140-B8A0-71D52A82B6A1}"/>
               </a:ext>
             </a:extLst>
           </p:cNvPr>
@@ -1256,7 +2362,7 @@
           <p:cNvPr id="3" name="內容版面配置區 2">
             <a:extLst>
               <a:ext uri="{FF2B5EF4-FFF2-40B4-BE49-F238E27FC236}">
-                <a16:creationId xmlns:a16="http://schemas.microsoft.com/office/drawing/2014/main" id="{9FDE4E9B-689C-4373-B281-9636BE211982}"/>
+                <a16:creationId xmlns:a16="http://schemas.microsoft.com/office/drawing/2014/main" id="{3E0190E1-A656-3FC9-D8CD-6FD169DE5D38}"/>
               </a:ext>
             </a:extLst>
           </p:cNvPr>
@@ -1318,7 +2424,7 @@
           <p:cNvPr id="4" name="內容版面配置區 3">
             <a:extLst>
               <a:ext uri="{FF2B5EF4-FFF2-40B4-BE49-F238E27FC236}">
-                <a16:creationId xmlns:a16="http://schemas.microsoft.com/office/drawing/2014/main" id="{CD25EC10-0BDA-4ECA-AB8E-059AC3378E22}"/>
+                <a16:creationId xmlns:a16="http://schemas.microsoft.com/office/drawing/2014/main" id="{955DE48C-0411-D17A-4BF3-B002A2090925}"/>
               </a:ext>
             </a:extLst>
           </p:cNvPr>
@@ -1380,7 +2486,7 @@
           <p:cNvPr id="5" name="日期版面配置區 4">
             <a:extLst>
               <a:ext uri="{FF2B5EF4-FFF2-40B4-BE49-F238E27FC236}">
-                <a16:creationId xmlns:a16="http://schemas.microsoft.com/office/drawing/2014/main" id="{63DAF127-0983-4C38-869C-C0A513FA9147}"/>
+                <a16:creationId xmlns:a16="http://schemas.microsoft.com/office/drawing/2014/main" id="{ACCB53C1-E47A-798E-10AD-0B7E4E2E07CB}"/>
               </a:ext>
             </a:extLst>
           </p:cNvPr>
@@ -1396,9 +2502,9 @@
           <a:bodyPr/>
           <a:lstStyle/>
           <a:p>
-            <a:fld id="{C3C90D7E-32D6-4894-AE08-7BBB3E610FC9}" type="datetimeFigureOut">
+            <a:fld id="{458E591F-1D90-4A08-BEBB-9552D45ACD8D}" type="datetimeFigureOut">
               <a:rPr lang="zh-TW" altLang="en-US" smtClean="0"/>
-              <a:t>2024/9/16</a:t>
+              <a:t>2024/10/26</a:t>
             </a:fld>
             <a:endParaRPr lang="zh-TW" altLang="en-US"/>
           </a:p>
@@ -1409,7 +2515,7 @@
           <p:cNvPr id="6" name="頁尾版面配置區 5">
             <a:extLst>
               <a:ext uri="{FF2B5EF4-FFF2-40B4-BE49-F238E27FC236}">
-                <a16:creationId xmlns:a16="http://schemas.microsoft.com/office/drawing/2014/main" id="{E014CBA6-CCE3-4CF4-8E13-D895EDBD8F25}"/>
+                <a16:creationId xmlns:a16="http://schemas.microsoft.com/office/drawing/2014/main" id="{40B0A0CB-B7D5-0C87-7F7F-AF2DE05A116D}"/>
               </a:ext>
             </a:extLst>
           </p:cNvPr>
@@ -1434,7 +2540,7 @@
           <p:cNvPr id="7" name="投影片編號版面配置區 6">
             <a:extLst>
               <a:ext uri="{FF2B5EF4-FFF2-40B4-BE49-F238E27FC236}">
-                <a16:creationId xmlns:a16="http://schemas.microsoft.com/office/drawing/2014/main" id="{5CEAA8E5-79B3-445E-B8C3-29BD56CE6D7A}"/>
+                <a16:creationId xmlns:a16="http://schemas.microsoft.com/office/drawing/2014/main" id="{55C2BF69-708E-84EE-FB50-BDD71D036061}"/>
               </a:ext>
             </a:extLst>
           </p:cNvPr>
@@ -1450,7 +2556,7 @@
           <a:bodyPr/>
           <a:lstStyle/>
           <a:p>
-            <a:fld id="{E31EC408-072F-4346-BD0A-D6AA5788A305}" type="slidenum">
+            <a:fld id="{9B3887EC-0C89-4BEA-9AE1-52834055F7A5}" type="slidenum">
               <a:rPr lang="zh-TW" altLang="en-US" smtClean="0"/>
               <a:t>‹#›</a:t>
             </a:fld>
@@ -1461,7 +2567,7 @@
     </p:spTree>
     <p:extLst>
       <p:ext uri="{BB962C8B-B14F-4D97-AF65-F5344CB8AC3E}">
-        <p14:creationId xmlns:p14="http://schemas.microsoft.com/office/powerpoint/2010/main" val="3858213488"/>
+        <p14:creationId xmlns:p14="http://schemas.microsoft.com/office/powerpoint/2010/main" val="3110219252"/>
       </p:ext>
     </p:extLst>
   </p:cSld>
@@ -1493,7 +2599,7 @@
           <p:cNvPr id="2" name="標題 1">
             <a:extLst>
               <a:ext uri="{FF2B5EF4-FFF2-40B4-BE49-F238E27FC236}">
-                <a16:creationId xmlns:a16="http://schemas.microsoft.com/office/drawing/2014/main" id="{A00F76B6-8DEC-4A74-A06A-BA0146321CD8}"/>
+                <a16:creationId xmlns:a16="http://schemas.microsoft.com/office/drawing/2014/main" id="{D84DF997-A7AB-6FB5-9BB5-5478A90C59EA}"/>
               </a:ext>
             </a:extLst>
           </p:cNvPr>
@@ -1526,7 +2632,7 @@
           <p:cNvPr id="3" name="文字版面配置區 2">
             <a:extLst>
               <a:ext uri="{FF2B5EF4-FFF2-40B4-BE49-F238E27FC236}">
-                <a16:creationId xmlns:a16="http://schemas.microsoft.com/office/drawing/2014/main" id="{EF00F5C5-99A7-4F16-855A-F170362659F7}"/>
+                <a16:creationId xmlns:a16="http://schemas.microsoft.com/office/drawing/2014/main" id="{4884F2CB-060A-4420-DECC-85D24FB44553}"/>
               </a:ext>
             </a:extLst>
           </p:cNvPr>
@@ -1597,7 +2703,7 @@
           <p:cNvPr id="4" name="內容版面配置區 3">
             <a:extLst>
               <a:ext uri="{FF2B5EF4-FFF2-40B4-BE49-F238E27FC236}">
-                <a16:creationId xmlns:a16="http://schemas.microsoft.com/office/drawing/2014/main" id="{6722BEB2-C9B4-4C14-8234-D17E84349984}"/>
+                <a16:creationId xmlns:a16="http://schemas.microsoft.com/office/drawing/2014/main" id="{A053B9F1-103A-FDFC-D3EA-BC63E9EA576F}"/>
               </a:ext>
             </a:extLst>
           </p:cNvPr>
@@ -1659,7 +2765,7 @@
           <p:cNvPr id="5" name="文字版面配置區 4">
             <a:extLst>
               <a:ext uri="{FF2B5EF4-FFF2-40B4-BE49-F238E27FC236}">
-                <a16:creationId xmlns:a16="http://schemas.microsoft.com/office/drawing/2014/main" id="{E4A41162-A0AC-4211-940F-4B92208F9B0E}"/>
+                <a16:creationId xmlns:a16="http://schemas.microsoft.com/office/drawing/2014/main" id="{F5B481A7-8255-4A43-C4D6-CEE42F61EAB8}"/>
               </a:ext>
             </a:extLst>
           </p:cNvPr>
@@ -1730,7 +2836,7 @@
           <p:cNvPr id="6" name="內容版面配置區 5">
             <a:extLst>
               <a:ext uri="{FF2B5EF4-FFF2-40B4-BE49-F238E27FC236}">
-                <a16:creationId xmlns:a16="http://schemas.microsoft.com/office/drawing/2014/main" id="{E8EA159A-F9D7-4F58-A7C3-6E5B65E42266}"/>
+                <a16:creationId xmlns:a16="http://schemas.microsoft.com/office/drawing/2014/main" id="{55F8401A-FA4D-9669-BCF6-A877550BBE1C}"/>
               </a:ext>
             </a:extLst>
           </p:cNvPr>
@@ -1792,7 +2898,7 @@
           <p:cNvPr id="7" name="日期版面配置區 6">
             <a:extLst>
               <a:ext uri="{FF2B5EF4-FFF2-40B4-BE49-F238E27FC236}">
-                <a16:creationId xmlns:a16="http://schemas.microsoft.com/office/drawing/2014/main" id="{AE973E80-9141-48B7-A9D7-605A4541768F}"/>
+                <a16:creationId xmlns:a16="http://schemas.microsoft.com/office/drawing/2014/main" id="{91A1482E-36C0-EEA6-E517-1F169D30686F}"/>
               </a:ext>
             </a:extLst>
           </p:cNvPr>
@@ -1808,9 +2914,9 @@
           <a:bodyPr/>
           <a:lstStyle/>
           <a:p>
-            <a:fld id="{C3C90D7E-32D6-4894-AE08-7BBB3E610FC9}" type="datetimeFigureOut">
+            <a:fld id="{458E591F-1D90-4A08-BEBB-9552D45ACD8D}" type="datetimeFigureOut">
               <a:rPr lang="zh-TW" altLang="en-US" smtClean="0"/>
-              <a:t>2024/9/16</a:t>
+              <a:t>2024/10/26</a:t>
             </a:fld>
             <a:endParaRPr lang="zh-TW" altLang="en-US"/>
           </a:p>
@@ -1821,7 +2927,7 @@
           <p:cNvPr id="8" name="頁尾版面配置區 7">
             <a:extLst>
               <a:ext uri="{FF2B5EF4-FFF2-40B4-BE49-F238E27FC236}">
-                <a16:creationId xmlns:a16="http://schemas.microsoft.com/office/drawing/2014/main" id="{6520B07A-79F8-43E7-8013-632DD2AED223}"/>
+                <a16:creationId xmlns:a16="http://schemas.microsoft.com/office/drawing/2014/main" id="{678EE907-0883-27E0-F00F-F851727801AF}"/>
               </a:ext>
             </a:extLst>
           </p:cNvPr>
@@ -1846,7 +2952,7 @@
           <p:cNvPr id="9" name="投影片編號版面配置區 8">
             <a:extLst>
               <a:ext uri="{FF2B5EF4-FFF2-40B4-BE49-F238E27FC236}">
-                <a16:creationId xmlns:a16="http://schemas.microsoft.com/office/drawing/2014/main" id="{3B997D8F-4F1C-4DE6-A82C-3E0C38ACAE96}"/>
+                <a16:creationId xmlns:a16="http://schemas.microsoft.com/office/drawing/2014/main" id="{569BF134-34F8-43F4-4959-5B2A919F5FD5}"/>
               </a:ext>
             </a:extLst>
           </p:cNvPr>
@@ -1862,7 +2968,7 @@
           <a:bodyPr/>
           <a:lstStyle/>
           <a:p>
-            <a:fld id="{E31EC408-072F-4346-BD0A-D6AA5788A305}" type="slidenum">
+            <a:fld id="{9B3887EC-0C89-4BEA-9AE1-52834055F7A5}" type="slidenum">
               <a:rPr lang="zh-TW" altLang="en-US" smtClean="0"/>
               <a:t>‹#›</a:t>
             </a:fld>
@@ -1873,7 +2979,7 @@
     </p:spTree>
     <p:extLst>
       <p:ext uri="{BB962C8B-B14F-4D97-AF65-F5344CB8AC3E}">
-        <p14:creationId xmlns:p14="http://schemas.microsoft.com/office/powerpoint/2010/main" val="3379995638"/>
+        <p14:creationId xmlns:p14="http://schemas.microsoft.com/office/powerpoint/2010/main" val="1298584693"/>
       </p:ext>
     </p:extLst>
   </p:cSld>
@@ -1905,7 +3011,7 @@
           <p:cNvPr id="2" name="標題 1">
             <a:extLst>
               <a:ext uri="{FF2B5EF4-FFF2-40B4-BE49-F238E27FC236}">
-                <a16:creationId xmlns:a16="http://schemas.microsoft.com/office/drawing/2014/main" id="{6CE04611-FD10-429D-89AA-73C259B64293}"/>
+                <a16:creationId xmlns:a16="http://schemas.microsoft.com/office/drawing/2014/main" id="{C1659CBA-4CB8-8140-5561-97F6B6884147}"/>
               </a:ext>
             </a:extLst>
           </p:cNvPr>
@@ -1933,7 +3039,7 @@
           <p:cNvPr id="3" name="日期版面配置區 2">
             <a:extLst>
               <a:ext uri="{FF2B5EF4-FFF2-40B4-BE49-F238E27FC236}">
-                <a16:creationId xmlns:a16="http://schemas.microsoft.com/office/drawing/2014/main" id="{2D9009F3-A280-4DA8-ACC4-187DE2172BCA}"/>
+                <a16:creationId xmlns:a16="http://schemas.microsoft.com/office/drawing/2014/main" id="{9BD4C3BD-8813-6214-8026-664E15E547F4}"/>
               </a:ext>
             </a:extLst>
           </p:cNvPr>
@@ -1949,9 +3055,9 @@
           <a:bodyPr/>
           <a:lstStyle/>
           <a:p>
-            <a:fld id="{C3C90D7E-32D6-4894-AE08-7BBB3E610FC9}" type="datetimeFigureOut">
+            <a:fld id="{458E591F-1D90-4A08-BEBB-9552D45ACD8D}" type="datetimeFigureOut">
               <a:rPr lang="zh-TW" altLang="en-US" smtClean="0"/>
-              <a:t>2024/9/16</a:t>
+              <a:t>2024/10/26</a:t>
             </a:fld>
             <a:endParaRPr lang="zh-TW" altLang="en-US"/>
           </a:p>
@@ -1962,7 +3068,7 @@
           <p:cNvPr id="4" name="頁尾版面配置區 3">
             <a:extLst>
               <a:ext uri="{FF2B5EF4-FFF2-40B4-BE49-F238E27FC236}">
-                <a16:creationId xmlns:a16="http://schemas.microsoft.com/office/drawing/2014/main" id="{F8FD791E-F627-4DDB-AD69-F7639FDD1767}"/>
+                <a16:creationId xmlns:a16="http://schemas.microsoft.com/office/drawing/2014/main" id="{7C6469EB-BF88-8E48-77CE-ADD4FE051088}"/>
               </a:ext>
             </a:extLst>
           </p:cNvPr>
@@ -1987,7 +3093,7 @@
           <p:cNvPr id="5" name="投影片編號版面配置區 4">
             <a:extLst>
               <a:ext uri="{FF2B5EF4-FFF2-40B4-BE49-F238E27FC236}">
-                <a16:creationId xmlns:a16="http://schemas.microsoft.com/office/drawing/2014/main" id="{CE9C3C73-9A1B-4A20-B40C-BF8E0726E9AE}"/>
+                <a16:creationId xmlns:a16="http://schemas.microsoft.com/office/drawing/2014/main" id="{B0F79711-6FAF-E1DA-6F25-638F6AA9FA5A}"/>
               </a:ext>
             </a:extLst>
           </p:cNvPr>
@@ -2003,7 +3109,7 @@
           <a:bodyPr/>
           <a:lstStyle/>
           <a:p>
-            <a:fld id="{E31EC408-072F-4346-BD0A-D6AA5788A305}" type="slidenum">
+            <a:fld id="{9B3887EC-0C89-4BEA-9AE1-52834055F7A5}" type="slidenum">
               <a:rPr lang="zh-TW" altLang="en-US" smtClean="0"/>
               <a:t>‹#›</a:t>
             </a:fld>
@@ -2014,7 +3120,7 @@
     </p:spTree>
     <p:extLst>
       <p:ext uri="{BB962C8B-B14F-4D97-AF65-F5344CB8AC3E}">
-        <p14:creationId xmlns:p14="http://schemas.microsoft.com/office/powerpoint/2010/main" val="3116621787"/>
+        <p14:creationId xmlns:p14="http://schemas.microsoft.com/office/powerpoint/2010/main" val="2265359424"/>
       </p:ext>
     </p:extLst>
   </p:cSld>
@@ -2046,7 +3152,7 @@
           <p:cNvPr id="2" name="日期版面配置區 1">
             <a:extLst>
               <a:ext uri="{FF2B5EF4-FFF2-40B4-BE49-F238E27FC236}">
-                <a16:creationId xmlns:a16="http://schemas.microsoft.com/office/drawing/2014/main" id="{1E1D8EED-F2A7-4221-9887-0DBB62EB3F80}"/>
+                <a16:creationId xmlns:a16="http://schemas.microsoft.com/office/drawing/2014/main" id="{9554B1F9-7208-4365-442A-3390486DE600}"/>
               </a:ext>
             </a:extLst>
           </p:cNvPr>
@@ -2062,9 +3168,9 @@
           <a:bodyPr/>
           <a:lstStyle/>
           <a:p>
-            <a:fld id="{C3C90D7E-32D6-4894-AE08-7BBB3E610FC9}" type="datetimeFigureOut">
+            <a:fld id="{458E591F-1D90-4A08-BEBB-9552D45ACD8D}" type="datetimeFigureOut">
               <a:rPr lang="zh-TW" altLang="en-US" smtClean="0"/>
-              <a:t>2024/9/16</a:t>
+              <a:t>2024/10/26</a:t>
             </a:fld>
             <a:endParaRPr lang="zh-TW" altLang="en-US"/>
           </a:p>
@@ -2075,7 +3181,7 @@
           <p:cNvPr id="3" name="頁尾版面配置區 2">
             <a:extLst>
               <a:ext uri="{FF2B5EF4-FFF2-40B4-BE49-F238E27FC236}">
-                <a16:creationId xmlns:a16="http://schemas.microsoft.com/office/drawing/2014/main" id="{10593B39-DC86-45A7-85EF-B4DB9C28DC80}"/>
+                <a16:creationId xmlns:a16="http://schemas.microsoft.com/office/drawing/2014/main" id="{D1AA7430-2091-0988-E1AD-6E42204A7EA6}"/>
               </a:ext>
             </a:extLst>
           </p:cNvPr>
@@ -2100,7 +3206,7 @@
           <p:cNvPr id="4" name="投影片編號版面配置區 3">
             <a:extLst>
               <a:ext uri="{FF2B5EF4-FFF2-40B4-BE49-F238E27FC236}">
-                <a16:creationId xmlns:a16="http://schemas.microsoft.com/office/drawing/2014/main" id="{3D9056B2-6966-4CAF-94D1-2295A737E168}"/>
+                <a16:creationId xmlns:a16="http://schemas.microsoft.com/office/drawing/2014/main" id="{6173530C-2C6C-F552-6768-122B53D74F59}"/>
               </a:ext>
             </a:extLst>
           </p:cNvPr>
@@ -2116,7 +3222,7 @@
           <a:bodyPr/>
           <a:lstStyle/>
           <a:p>
-            <a:fld id="{E31EC408-072F-4346-BD0A-D6AA5788A305}" type="slidenum">
+            <a:fld id="{9B3887EC-0C89-4BEA-9AE1-52834055F7A5}" type="slidenum">
               <a:rPr lang="zh-TW" altLang="en-US" smtClean="0"/>
               <a:t>‹#›</a:t>
             </a:fld>
@@ -2127,7 +3233,7 @@
     </p:spTree>
     <p:extLst>
       <p:ext uri="{BB962C8B-B14F-4D97-AF65-F5344CB8AC3E}">
-        <p14:creationId xmlns:p14="http://schemas.microsoft.com/office/powerpoint/2010/main" val="3887241942"/>
+        <p14:creationId xmlns:p14="http://schemas.microsoft.com/office/powerpoint/2010/main" val="2709965229"/>
       </p:ext>
     </p:extLst>
   </p:cSld>
@@ -2159,7 +3265,7 @@
           <p:cNvPr id="2" name="標題 1">
             <a:extLst>
               <a:ext uri="{FF2B5EF4-FFF2-40B4-BE49-F238E27FC236}">
-                <a16:creationId xmlns:a16="http://schemas.microsoft.com/office/drawing/2014/main" id="{5C3076DF-D16B-4600-9550-96C6A8DD7F1A}"/>
+                <a16:creationId xmlns:a16="http://schemas.microsoft.com/office/drawing/2014/main" id="{AA4C8B7F-9AE3-BB4B-6584-A3B95F400A86}"/>
               </a:ext>
             </a:extLst>
           </p:cNvPr>
@@ -2196,7 +3302,7 @@
           <p:cNvPr id="3" name="內容版面配置區 2">
             <a:extLst>
               <a:ext uri="{FF2B5EF4-FFF2-40B4-BE49-F238E27FC236}">
-                <a16:creationId xmlns:a16="http://schemas.microsoft.com/office/drawing/2014/main" id="{9CD3D667-FDE5-4F5D-9495-588EC18912CE}"/>
+                <a16:creationId xmlns:a16="http://schemas.microsoft.com/office/drawing/2014/main" id="{4EB04FC1-62CA-7FB1-4E4C-199437ABC7A0}"/>
               </a:ext>
             </a:extLst>
           </p:cNvPr>
@@ -2286,7 +3392,7 @@
           <p:cNvPr id="4" name="文字版面配置區 3">
             <a:extLst>
               <a:ext uri="{FF2B5EF4-FFF2-40B4-BE49-F238E27FC236}">
-                <a16:creationId xmlns:a16="http://schemas.microsoft.com/office/drawing/2014/main" id="{22F511E7-BEEF-4F51-BA0E-52C1908D5608}"/>
+                <a16:creationId xmlns:a16="http://schemas.microsoft.com/office/drawing/2014/main" id="{27AB305F-8020-9810-FAD0-CE32E893C56C}"/>
               </a:ext>
             </a:extLst>
           </p:cNvPr>
@@ -2357,7 +3463,7 @@
           <p:cNvPr id="5" name="日期版面配置區 4">
             <a:extLst>
               <a:ext uri="{FF2B5EF4-FFF2-40B4-BE49-F238E27FC236}">
-                <a16:creationId xmlns:a16="http://schemas.microsoft.com/office/drawing/2014/main" id="{88060697-A92E-4178-A790-FCBB90D70573}"/>
+                <a16:creationId xmlns:a16="http://schemas.microsoft.com/office/drawing/2014/main" id="{99BDEB0A-6333-6F90-7AD0-89C1EFBB69A2}"/>
               </a:ext>
             </a:extLst>
           </p:cNvPr>
@@ -2373,9 +3479,9 @@
           <a:bodyPr/>
           <a:lstStyle/>
           <a:p>
-            <a:fld id="{C3C90D7E-32D6-4894-AE08-7BBB3E610FC9}" type="datetimeFigureOut">
+            <a:fld id="{458E591F-1D90-4A08-BEBB-9552D45ACD8D}" type="datetimeFigureOut">
               <a:rPr lang="zh-TW" altLang="en-US" smtClean="0"/>
-              <a:t>2024/9/16</a:t>
+              <a:t>2024/10/26</a:t>
             </a:fld>
             <a:endParaRPr lang="zh-TW" altLang="en-US"/>
           </a:p>
@@ -2386,7 +3492,7 @@
           <p:cNvPr id="6" name="頁尾版面配置區 5">
             <a:extLst>
               <a:ext uri="{FF2B5EF4-FFF2-40B4-BE49-F238E27FC236}">
-                <a16:creationId xmlns:a16="http://schemas.microsoft.com/office/drawing/2014/main" id="{2A8E3F57-A99A-4C4C-BF14-EE42AB99CE78}"/>
+                <a16:creationId xmlns:a16="http://schemas.microsoft.com/office/drawing/2014/main" id="{88F9FD75-F2B4-8593-3A4D-BF57637DE3A0}"/>
               </a:ext>
             </a:extLst>
           </p:cNvPr>
@@ -2411,7 +3517,7 @@
           <p:cNvPr id="7" name="投影片編號版面配置區 6">
             <a:extLst>
               <a:ext uri="{FF2B5EF4-FFF2-40B4-BE49-F238E27FC236}">
-                <a16:creationId xmlns:a16="http://schemas.microsoft.com/office/drawing/2014/main" id="{39234440-6924-48D7-AC1A-200D5946BCA9}"/>
+                <a16:creationId xmlns:a16="http://schemas.microsoft.com/office/drawing/2014/main" id="{5555EBEB-90E1-79A5-A1D7-EC129D93FB62}"/>
               </a:ext>
             </a:extLst>
           </p:cNvPr>
@@ -2427,7 +3533,7 @@
           <a:bodyPr/>
           <a:lstStyle/>
           <a:p>
-            <a:fld id="{E31EC408-072F-4346-BD0A-D6AA5788A305}" type="slidenum">
+            <a:fld id="{9B3887EC-0C89-4BEA-9AE1-52834055F7A5}" type="slidenum">
               <a:rPr lang="zh-TW" altLang="en-US" smtClean="0"/>
               <a:t>‹#›</a:t>
             </a:fld>
@@ -2438,7 +3544,7 @@
     </p:spTree>
     <p:extLst>
       <p:ext uri="{BB962C8B-B14F-4D97-AF65-F5344CB8AC3E}">
-        <p14:creationId xmlns:p14="http://schemas.microsoft.com/office/powerpoint/2010/main" val="2036183199"/>
+        <p14:creationId xmlns:p14="http://schemas.microsoft.com/office/powerpoint/2010/main" val="534504568"/>
       </p:ext>
     </p:extLst>
   </p:cSld>
@@ -2470,7 +3576,7 @@
           <p:cNvPr id="2" name="標題 1">
             <a:extLst>
               <a:ext uri="{FF2B5EF4-FFF2-40B4-BE49-F238E27FC236}">
-                <a16:creationId xmlns:a16="http://schemas.microsoft.com/office/drawing/2014/main" id="{B2E81694-0B93-4D65-9DA3-21597478A96C}"/>
+                <a16:creationId xmlns:a16="http://schemas.microsoft.com/office/drawing/2014/main" id="{BFD34DC3-7FDA-1890-2FCE-FC677A1E31F7}"/>
               </a:ext>
             </a:extLst>
           </p:cNvPr>
@@ -2507,7 +3613,7 @@
           <p:cNvPr id="3" name="圖片版面配置區 2">
             <a:extLst>
               <a:ext uri="{FF2B5EF4-FFF2-40B4-BE49-F238E27FC236}">
-                <a16:creationId xmlns:a16="http://schemas.microsoft.com/office/drawing/2014/main" id="{23E4D718-8CB0-4334-BB8A-FB8B57D7CDC6}"/>
+                <a16:creationId xmlns:a16="http://schemas.microsoft.com/office/drawing/2014/main" id="{7F6CAA6C-E8DE-6933-C2DF-96DF03CF35EE}"/>
               </a:ext>
             </a:extLst>
           </p:cNvPr>
@@ -2574,7 +3680,7 @@
           <p:cNvPr id="4" name="文字版面配置區 3">
             <a:extLst>
               <a:ext uri="{FF2B5EF4-FFF2-40B4-BE49-F238E27FC236}">
-                <a16:creationId xmlns:a16="http://schemas.microsoft.com/office/drawing/2014/main" id="{0DC47463-53E7-4FE3-B60B-1657D11127BD}"/>
+                <a16:creationId xmlns:a16="http://schemas.microsoft.com/office/drawing/2014/main" id="{90F5F5ED-5287-ADBC-D3B5-305382C7DFCE}"/>
               </a:ext>
             </a:extLst>
           </p:cNvPr>
@@ -2645,7 +3751,7 @@
           <p:cNvPr id="5" name="日期版面配置區 4">
             <a:extLst>
               <a:ext uri="{FF2B5EF4-FFF2-40B4-BE49-F238E27FC236}">
-                <a16:creationId xmlns:a16="http://schemas.microsoft.com/office/drawing/2014/main" id="{28875DC5-6AFF-40C0-8C77-F81A0A3E1B0F}"/>
+                <a16:creationId xmlns:a16="http://schemas.microsoft.com/office/drawing/2014/main" id="{F15A63E8-B3F8-F162-4391-50CCCF8FF4B4}"/>
               </a:ext>
             </a:extLst>
           </p:cNvPr>
@@ -2661,9 +3767,9 @@
           <a:bodyPr/>
           <a:lstStyle/>
           <a:p>
-            <a:fld id="{C3C90D7E-32D6-4894-AE08-7BBB3E610FC9}" type="datetimeFigureOut">
+            <a:fld id="{458E591F-1D90-4A08-BEBB-9552D45ACD8D}" type="datetimeFigureOut">
               <a:rPr lang="zh-TW" altLang="en-US" smtClean="0"/>
-              <a:t>2024/9/16</a:t>
+              <a:t>2024/10/26</a:t>
             </a:fld>
             <a:endParaRPr lang="zh-TW" altLang="en-US"/>
           </a:p>
@@ -2674,7 +3780,7 @@
           <p:cNvPr id="6" name="頁尾版面配置區 5">
             <a:extLst>
               <a:ext uri="{FF2B5EF4-FFF2-40B4-BE49-F238E27FC236}">
-                <a16:creationId xmlns:a16="http://schemas.microsoft.com/office/drawing/2014/main" id="{24F8A973-6D07-4F0C-97A0-280FEFC238E0}"/>
+                <a16:creationId xmlns:a16="http://schemas.microsoft.com/office/drawing/2014/main" id="{EE51F9A6-3141-4956-1914-845E529DB73A}"/>
               </a:ext>
             </a:extLst>
           </p:cNvPr>
@@ -2699,7 +3805,7 @@
           <p:cNvPr id="7" name="投影片編號版面配置區 6">
             <a:extLst>
               <a:ext uri="{FF2B5EF4-FFF2-40B4-BE49-F238E27FC236}">
-                <a16:creationId xmlns:a16="http://schemas.microsoft.com/office/drawing/2014/main" id="{DB60BB1E-F41B-40F0-929B-5208374980BF}"/>
+                <a16:creationId xmlns:a16="http://schemas.microsoft.com/office/drawing/2014/main" id="{EC0C905B-4DBD-96CB-E912-CF09CE35ED63}"/>
               </a:ext>
             </a:extLst>
           </p:cNvPr>
@@ -2715,7 +3821,7 @@
           <a:bodyPr/>
           <a:lstStyle/>
           <a:p>
-            <a:fld id="{E31EC408-072F-4346-BD0A-D6AA5788A305}" type="slidenum">
+            <a:fld id="{9B3887EC-0C89-4BEA-9AE1-52834055F7A5}" type="slidenum">
               <a:rPr lang="zh-TW" altLang="en-US" smtClean="0"/>
               <a:t>‹#›</a:t>
             </a:fld>
@@ -2726,7 +3832,7 @@
     </p:spTree>
     <p:extLst>
       <p:ext uri="{BB962C8B-B14F-4D97-AF65-F5344CB8AC3E}">
-        <p14:creationId xmlns:p14="http://schemas.microsoft.com/office/powerpoint/2010/main" val="3148270851"/>
+        <p14:creationId xmlns:p14="http://schemas.microsoft.com/office/powerpoint/2010/main" val="495823409"/>
       </p:ext>
     </p:extLst>
   </p:cSld>
@@ -2740,9 +3846,12 @@
 <p:sldMaster xmlns:a="http://schemas.openxmlformats.org/drawingml/2006/main" xmlns:r="http://schemas.openxmlformats.org/officeDocument/2006/relationships" xmlns:p="http://schemas.openxmlformats.org/presentationml/2006/main">
   <p:cSld>
     <p:bg>
-      <p:bgRef idx="1001">
-        <a:schemeClr val="bg1"/>
-      </p:bgRef>
+      <p:bgPr>
+        <a:solidFill>
+          <a:srgbClr val="2D2D2D"/>
+        </a:solidFill>
+        <a:effectLst/>
+      </p:bgPr>
     </p:bg>
     <p:spTree>
       <p:nvGrpSpPr>
@@ -2763,7 +3872,7 @@
           <p:cNvPr id="2" name="標題版面配置區 1">
             <a:extLst>
               <a:ext uri="{FF2B5EF4-FFF2-40B4-BE49-F238E27FC236}">
-                <a16:creationId xmlns:a16="http://schemas.microsoft.com/office/drawing/2014/main" id="{B8575AAC-624C-4B52-ABD4-699B1E35D2CF}"/>
+                <a16:creationId xmlns:a16="http://schemas.microsoft.com/office/drawing/2014/main" id="{4953CC2A-8527-D211-F47B-13F5DB814443}"/>
               </a:ext>
             </a:extLst>
           </p:cNvPr>
@@ -2801,7 +3910,7 @@
           <p:cNvPr id="3" name="文字版面配置區 2">
             <a:extLst>
               <a:ext uri="{FF2B5EF4-FFF2-40B4-BE49-F238E27FC236}">
-                <a16:creationId xmlns:a16="http://schemas.microsoft.com/office/drawing/2014/main" id="{76722991-C57D-471F-8271-C419A1CFB074}"/>
+                <a16:creationId xmlns:a16="http://schemas.microsoft.com/office/drawing/2014/main" id="{59099570-F97F-306D-B825-877E0B73AE99}"/>
               </a:ext>
             </a:extLst>
           </p:cNvPr>
@@ -2868,7 +3977,7 @@
           <p:cNvPr id="4" name="日期版面配置區 3">
             <a:extLst>
               <a:ext uri="{FF2B5EF4-FFF2-40B4-BE49-F238E27FC236}">
-                <a16:creationId xmlns:a16="http://schemas.microsoft.com/office/drawing/2014/main" id="{85C839DD-8CBF-4E23-A0C7-7C039E950BB8}"/>
+                <a16:creationId xmlns:a16="http://schemas.microsoft.com/office/drawing/2014/main" id="{5B1C4C26-2CBB-BFAE-E369-C9A5AFD9B7E5}"/>
               </a:ext>
             </a:extLst>
           </p:cNvPr>
@@ -2902,9 +4011,9 @@
             </a:lvl1pPr>
           </a:lstStyle>
           <a:p>
-            <a:fld id="{C3C90D7E-32D6-4894-AE08-7BBB3E610FC9}" type="datetimeFigureOut">
+            <a:fld id="{458E591F-1D90-4A08-BEBB-9552D45ACD8D}" type="datetimeFigureOut">
               <a:rPr lang="zh-TW" altLang="en-US" smtClean="0"/>
-              <a:t>2024/9/16</a:t>
+              <a:t>2024/10/26</a:t>
             </a:fld>
             <a:endParaRPr lang="zh-TW" altLang="en-US"/>
           </a:p>
@@ -2915,7 +4024,7 @@
           <p:cNvPr id="5" name="頁尾版面配置區 4">
             <a:extLst>
               <a:ext uri="{FF2B5EF4-FFF2-40B4-BE49-F238E27FC236}">
-                <a16:creationId xmlns:a16="http://schemas.microsoft.com/office/drawing/2014/main" id="{12802D8A-77D4-418C-8190-43B6ADED2131}"/>
+                <a16:creationId xmlns:a16="http://schemas.microsoft.com/office/drawing/2014/main" id="{2923CF56-8EBF-BDAE-AAC7-01B025AEE4D2}"/>
               </a:ext>
             </a:extLst>
           </p:cNvPr>
@@ -2958,7 +4067,7 @@
           <p:cNvPr id="6" name="投影片編號版面配置區 5">
             <a:extLst>
               <a:ext uri="{FF2B5EF4-FFF2-40B4-BE49-F238E27FC236}">
-                <a16:creationId xmlns:a16="http://schemas.microsoft.com/office/drawing/2014/main" id="{7072B55E-2BE2-4AF4-AFF8-2A716F492F1C}"/>
+                <a16:creationId xmlns:a16="http://schemas.microsoft.com/office/drawing/2014/main" id="{68F161F2-86AD-25C6-4AC1-E4054F71329D}"/>
               </a:ext>
             </a:extLst>
           </p:cNvPr>
@@ -2992,7 +4101,7 @@
             </a:lvl1pPr>
           </a:lstStyle>
           <a:p>
-            <a:fld id="{E31EC408-072F-4346-BD0A-D6AA5788A305}" type="slidenum">
+            <a:fld id="{9B3887EC-0C89-4BEA-9AE1-52834055F7A5}" type="slidenum">
               <a:rPr lang="zh-TW" altLang="en-US" smtClean="0"/>
               <a:t>‹#›</a:t>
             </a:fld>
@@ -3003,7 +4112,7 @@
     </p:spTree>
     <p:extLst>
       <p:ext uri="{BB962C8B-B14F-4D97-AF65-F5344CB8AC3E}">
-        <p14:creationId xmlns:p14="http://schemas.microsoft.com/office/powerpoint/2010/main" val="2016052060"/>
+        <p14:creationId xmlns:p14="http://schemas.microsoft.com/office/powerpoint/2010/main" val="2655083221"/>
       </p:ext>
     </p:extLst>
   </p:cSld>
@@ -3309,7 +4418,13 @@
   <p:cSld>
     <p:spTree>
       <p:nvGrpSpPr>
-        <p:cNvPr id="1" name=""/>
+        <p:cNvPr id="1" name="">
+          <a:extLst>
+            <a:ext uri="{FF2B5EF4-FFF2-40B4-BE49-F238E27FC236}">
+              <a16:creationId xmlns:a16="http://schemas.microsoft.com/office/drawing/2014/main" id="{1520E96B-F950-F8D6-ADA6-178BAEA219BE}"/>
+            </a:ext>
+          </a:extLst>
+        </p:cNvPr>
         <p:cNvGrpSpPr/>
         <p:nvPr/>
       </p:nvGrpSpPr>
@@ -3321,60 +4436,1042 @@
           <a:chExt cx="0" cy="0"/>
         </a:xfrm>
       </p:grpSpPr>
-      <p:sp>
-        <p:nvSpPr>
-          <p:cNvPr id="2" name="標題 1">
-            <a:extLst>
-              <a:ext uri="{FF2B5EF4-FFF2-40B4-BE49-F238E27FC236}">
-                <a16:creationId xmlns:a16="http://schemas.microsoft.com/office/drawing/2014/main" id="{32532283-9F93-4E44-8138-32796965361F}"/>
-              </a:ext>
-            </a:extLst>
-          </p:cNvPr>
-          <p:cNvSpPr>
-            <a:spLocks noGrp="1"/>
-          </p:cNvSpPr>
-          <p:nvPr>
-            <p:ph type="ctrTitle"/>
-          </p:nvPr>
-        </p:nvSpPr>
-        <p:spPr/>
-        <p:txBody>
-          <a:bodyPr/>
-          <a:lstStyle/>
-          <a:p>
-            <a:endParaRPr lang="zh-TW" altLang="en-US"/>
-          </a:p>
-        </p:txBody>
-      </p:sp>
-      <p:sp>
-        <p:nvSpPr>
-          <p:cNvPr id="3" name="副標題 2">
-            <a:extLst>
-              <a:ext uri="{FF2B5EF4-FFF2-40B4-BE49-F238E27FC236}">
-                <a16:creationId xmlns:a16="http://schemas.microsoft.com/office/drawing/2014/main" id="{8C946F38-524D-4B98-B9CB-80AEE57E455A}"/>
-              </a:ext>
-            </a:extLst>
-          </p:cNvPr>
-          <p:cNvSpPr>
-            <a:spLocks noGrp="1"/>
-          </p:cNvSpPr>
-          <p:nvPr>
-            <p:ph type="subTitle" idx="1"/>
-          </p:nvPr>
-        </p:nvSpPr>
-        <p:spPr/>
-        <p:txBody>
-          <a:bodyPr/>
-          <a:lstStyle/>
-          <a:p>
-            <a:endParaRPr lang="zh-TW" altLang="en-US"/>
+      <p:pic>
+        <p:nvPicPr>
+          <p:cNvPr id="12" name="圖片 11">
+            <a:extLst>
+              <a:ext uri="{FF2B5EF4-FFF2-40B4-BE49-F238E27FC236}">
+                <a16:creationId xmlns:a16="http://schemas.microsoft.com/office/drawing/2014/main" id="{D875CBA2-27DC-2C25-CFE2-630AB785F7E7}"/>
+              </a:ext>
+            </a:extLst>
+          </p:cNvPr>
+          <p:cNvPicPr>
+            <a:picLocks noChangeAspect="1"/>
+          </p:cNvPicPr>
+          <p:nvPr/>
+        </p:nvPicPr>
+        <p:blipFill>
+          <a:blip r:embed="rId3"/>
+          <a:stretch>
+            <a:fillRect/>
+          </a:stretch>
+        </p:blipFill>
+        <p:spPr>
+          <a:xfrm>
+            <a:off x="0" y="1"/>
+            <a:ext cx="12192000" cy="6857999"/>
+          </a:xfrm>
+          <a:prstGeom prst="rect">
+            <a:avLst/>
+          </a:prstGeom>
+        </p:spPr>
+      </p:pic>
+      <p:sp>
+        <p:nvSpPr>
+          <p:cNvPr id="3" name="文字方塊 2">
+            <a:extLst>
+              <a:ext uri="{FF2B5EF4-FFF2-40B4-BE49-F238E27FC236}">
+                <a16:creationId xmlns:a16="http://schemas.microsoft.com/office/drawing/2014/main" id="{D984943F-1DDB-93B0-D770-A5DEB6EA11A6}"/>
+              </a:ext>
+            </a:extLst>
+          </p:cNvPr>
+          <p:cNvSpPr txBox="1"/>
+          <p:nvPr/>
+        </p:nvSpPr>
+        <p:spPr>
+          <a:xfrm>
+            <a:off x="2659635" y="2322365"/>
+            <a:ext cx="4588142" cy="1200329"/>
+          </a:xfrm>
+          <a:prstGeom prst="rect">
+            <a:avLst/>
+          </a:prstGeom>
+          <a:noFill/>
+        </p:spPr>
+        <p:txBody>
+          <a:bodyPr wrap="square" rtlCol="0">
+            <a:spAutoFit/>
+          </a:bodyPr>
+          <a:lstStyle/>
+          <a:p>
+            <a:pPr algn="ctr"/>
+            <a:r>
+              <a:rPr lang="zh-TW" altLang="en-US" sz="7200" dirty="0">
+                <a:solidFill>
+                  <a:srgbClr val="BDACD5"/>
+                </a:solidFill>
+                <a:latin typeface="宅在家麥克筆" panose="02020300000000000000" pitchFamily="18" charset="-120"/>
+                <a:ea typeface="宅在家麥克筆" panose="02020300000000000000" pitchFamily="18" charset="-120"/>
+                <a:cs typeface="宅在家麥克筆" panose="02020300000000000000" pitchFamily="18" charset="-120"/>
+              </a:rPr>
+              <a:t>自我介紹</a:t>
+            </a:r>
           </a:p>
         </p:txBody>
       </p:sp>
     </p:spTree>
     <p:extLst>
       <p:ext uri="{BB962C8B-B14F-4D97-AF65-F5344CB8AC3E}">
-        <p14:creationId xmlns:p14="http://schemas.microsoft.com/office/powerpoint/2010/main" val="1328321055"/>
+        <p14:creationId xmlns:p14="http://schemas.microsoft.com/office/powerpoint/2010/main" val="253017904"/>
+      </p:ext>
+    </p:extLst>
+  </p:cSld>
+  <p:clrMapOvr>
+    <a:masterClrMapping/>
+  </p:clrMapOvr>
+</p:sld>
+</file>
+
+<file path=ppt/slides/slide2.xml><?xml version="1.0" encoding="utf-8"?>
+<p:sld xmlns:a="http://schemas.openxmlformats.org/drawingml/2006/main" xmlns:r="http://schemas.openxmlformats.org/officeDocument/2006/relationships" xmlns:p="http://schemas.openxmlformats.org/presentationml/2006/main">
+  <p:cSld>
+    <p:spTree>
+      <p:nvGrpSpPr>
+        <p:cNvPr id="1" name="">
+          <a:extLst>
+            <a:ext uri="{FF2B5EF4-FFF2-40B4-BE49-F238E27FC236}">
+              <a16:creationId xmlns:a16="http://schemas.microsoft.com/office/drawing/2014/main" id="{DAD53376-93F0-3739-06D3-8B5907EED51C}"/>
+            </a:ext>
+          </a:extLst>
+        </p:cNvPr>
+        <p:cNvGrpSpPr/>
+        <p:nvPr/>
+      </p:nvGrpSpPr>
+      <p:grpSpPr>
+        <a:xfrm>
+          <a:off x="0" y="0"/>
+          <a:ext cx="0" cy="0"/>
+          <a:chOff x="0" y="0"/>
+          <a:chExt cx="0" cy="0"/>
+        </a:xfrm>
+      </p:grpSpPr>
+      <p:pic>
+        <p:nvPicPr>
+          <p:cNvPr id="4" name="圖片 3">
+            <a:extLst>
+              <a:ext uri="{FF2B5EF4-FFF2-40B4-BE49-F238E27FC236}">
+                <a16:creationId xmlns:a16="http://schemas.microsoft.com/office/drawing/2014/main" id="{04524611-2442-FEFB-0018-90A96AA8ED6E}"/>
+              </a:ext>
+            </a:extLst>
+          </p:cNvPr>
+          <p:cNvPicPr>
+            <a:picLocks noChangeAspect="1"/>
+          </p:cNvPicPr>
+          <p:nvPr/>
+        </p:nvPicPr>
+        <p:blipFill>
+          <a:blip r:embed="rId3"/>
+          <a:srcRect/>
+          <a:stretch/>
+        </p:blipFill>
+        <p:spPr>
+          <a:xfrm>
+            <a:off x="2321278" y="290102"/>
+            <a:ext cx="5264856" cy="5264856"/>
+          </a:xfrm>
+          <a:prstGeom prst="rect">
+            <a:avLst/>
+          </a:prstGeom>
+        </p:spPr>
+      </p:pic>
+      <p:pic>
+        <p:nvPicPr>
+          <p:cNvPr id="12" name="圖片 11">
+            <a:extLst>
+              <a:ext uri="{FF2B5EF4-FFF2-40B4-BE49-F238E27FC236}">
+                <a16:creationId xmlns:a16="http://schemas.microsoft.com/office/drawing/2014/main" id="{7E856704-8900-BF5D-AE18-7308DA19EDB3}"/>
+              </a:ext>
+            </a:extLst>
+          </p:cNvPr>
+          <p:cNvPicPr>
+            <a:picLocks noChangeAspect="1"/>
+          </p:cNvPicPr>
+          <p:nvPr/>
+        </p:nvPicPr>
+        <p:blipFill>
+          <a:blip r:embed="rId4"/>
+          <a:stretch>
+            <a:fillRect/>
+          </a:stretch>
+        </p:blipFill>
+        <p:spPr>
+          <a:xfrm>
+            <a:off x="0" y="1"/>
+            <a:ext cx="12192000" cy="6857999"/>
+          </a:xfrm>
+          <a:prstGeom prst="rect">
+            <a:avLst/>
+          </a:prstGeom>
+        </p:spPr>
+      </p:pic>
+      <p:sp>
+        <p:nvSpPr>
+          <p:cNvPr id="2" name="文字方塊 1">
+            <a:extLst>
+              <a:ext uri="{FF2B5EF4-FFF2-40B4-BE49-F238E27FC236}">
+                <a16:creationId xmlns:a16="http://schemas.microsoft.com/office/drawing/2014/main" id="{BBAD8C21-B5D7-1BCB-4EE5-F2E5CD81EA99}"/>
+              </a:ext>
+            </a:extLst>
+          </p:cNvPr>
+          <p:cNvSpPr txBox="1"/>
+          <p:nvPr/>
+        </p:nvSpPr>
+        <p:spPr>
+          <a:xfrm>
+            <a:off x="740214" y="5736900"/>
+            <a:ext cx="1415772" cy="830997"/>
+          </a:xfrm>
+          <a:prstGeom prst="rect">
+            <a:avLst/>
+          </a:prstGeom>
+          <a:noFill/>
+        </p:spPr>
+        <p:txBody>
+          <a:bodyPr wrap="none" rtlCol="0">
+            <a:spAutoFit/>
+          </a:bodyPr>
+          <a:lstStyle/>
+          <a:p>
+            <a:r>
+              <a:rPr lang="zh-TW" altLang="en-US" sz="4800" dirty="0">
+                <a:solidFill>
+                  <a:srgbClr val="BDACD5"/>
+                </a:solidFill>
+                <a:latin typeface="宅在家麥克筆" panose="02020300000000000000" pitchFamily="18" charset="-120"/>
+                <a:ea typeface="宅在家麥克筆" panose="02020300000000000000" pitchFamily="18" charset="-120"/>
+                <a:cs typeface="宅在家麥克筆" panose="02020300000000000000" pitchFamily="18" charset="-120"/>
+              </a:rPr>
+              <a:t>目標</a:t>
+            </a:r>
+          </a:p>
+        </p:txBody>
+      </p:sp>
+    </p:spTree>
+    <p:extLst>
+      <p:ext uri="{BB962C8B-B14F-4D97-AF65-F5344CB8AC3E}">
+        <p14:creationId xmlns:p14="http://schemas.microsoft.com/office/powerpoint/2010/main" val="2595096296"/>
+      </p:ext>
+    </p:extLst>
+  </p:cSld>
+  <p:clrMapOvr>
+    <a:masterClrMapping/>
+  </p:clrMapOvr>
+</p:sld>
+</file>
+
+<file path=ppt/slides/slide3.xml><?xml version="1.0" encoding="utf-8"?>
+<p:sld xmlns:a="http://schemas.openxmlformats.org/drawingml/2006/main" xmlns:r="http://schemas.openxmlformats.org/officeDocument/2006/relationships" xmlns:p="http://schemas.openxmlformats.org/presentationml/2006/main">
+  <p:cSld>
+    <p:spTree>
+      <p:nvGrpSpPr>
+        <p:cNvPr id="1" name="">
+          <a:extLst>
+            <a:ext uri="{FF2B5EF4-FFF2-40B4-BE49-F238E27FC236}">
+              <a16:creationId xmlns:a16="http://schemas.microsoft.com/office/drawing/2014/main" id="{C6FF665C-3827-CBFB-B695-337031E93B2A}"/>
+            </a:ext>
+          </a:extLst>
+        </p:cNvPr>
+        <p:cNvGrpSpPr/>
+        <p:nvPr/>
+      </p:nvGrpSpPr>
+      <p:grpSpPr>
+        <a:xfrm>
+          <a:off x="0" y="0"/>
+          <a:ext cx="0" cy="0"/>
+          <a:chOff x="0" y="0"/>
+          <a:chExt cx="0" cy="0"/>
+        </a:xfrm>
+      </p:grpSpPr>
+      <p:pic>
+        <p:nvPicPr>
+          <p:cNvPr id="3" name="圖片 2">
+            <a:extLst>
+              <a:ext uri="{FF2B5EF4-FFF2-40B4-BE49-F238E27FC236}">
+                <a16:creationId xmlns:a16="http://schemas.microsoft.com/office/drawing/2014/main" id="{F431B232-59C9-7FF7-3A7A-2EEED385CC11}"/>
+              </a:ext>
+            </a:extLst>
+          </p:cNvPr>
+          <p:cNvPicPr>
+            <a:picLocks noChangeAspect="1"/>
+          </p:cNvPicPr>
+          <p:nvPr/>
+        </p:nvPicPr>
+        <p:blipFill>
+          <a:blip r:embed="rId3"/>
+          <a:srcRect/>
+          <a:stretch/>
+        </p:blipFill>
+        <p:spPr>
+          <a:xfrm>
+            <a:off x="2321278" y="290102"/>
+            <a:ext cx="5264856" cy="5264856"/>
+          </a:xfrm>
+          <a:prstGeom prst="rect">
+            <a:avLst/>
+          </a:prstGeom>
+        </p:spPr>
+      </p:pic>
+      <p:pic>
+        <p:nvPicPr>
+          <p:cNvPr id="12" name="圖片 11">
+            <a:extLst>
+              <a:ext uri="{FF2B5EF4-FFF2-40B4-BE49-F238E27FC236}">
+                <a16:creationId xmlns:a16="http://schemas.microsoft.com/office/drawing/2014/main" id="{DFAFD443-99A6-F384-5C7B-6E7548C49B40}"/>
+              </a:ext>
+            </a:extLst>
+          </p:cNvPr>
+          <p:cNvPicPr>
+            <a:picLocks noChangeAspect="1"/>
+          </p:cNvPicPr>
+          <p:nvPr/>
+        </p:nvPicPr>
+        <p:blipFill>
+          <a:blip r:embed="rId4"/>
+          <a:stretch>
+            <a:fillRect/>
+          </a:stretch>
+        </p:blipFill>
+        <p:spPr>
+          <a:xfrm>
+            <a:off x="0" y="1"/>
+            <a:ext cx="12192000" cy="6857999"/>
+          </a:xfrm>
+          <a:prstGeom prst="rect">
+            <a:avLst/>
+          </a:prstGeom>
+        </p:spPr>
+      </p:pic>
+      <p:sp>
+        <p:nvSpPr>
+          <p:cNvPr id="2" name="文字方塊 1">
+            <a:extLst>
+              <a:ext uri="{FF2B5EF4-FFF2-40B4-BE49-F238E27FC236}">
+                <a16:creationId xmlns:a16="http://schemas.microsoft.com/office/drawing/2014/main" id="{4160361B-4F44-B8E9-CF3A-BDCD182C967D}"/>
+              </a:ext>
+            </a:extLst>
+          </p:cNvPr>
+          <p:cNvSpPr txBox="1"/>
+          <p:nvPr/>
+        </p:nvSpPr>
+        <p:spPr>
+          <a:xfrm>
+            <a:off x="740214" y="5736900"/>
+            <a:ext cx="1415772" cy="830997"/>
+          </a:xfrm>
+          <a:prstGeom prst="rect">
+            <a:avLst/>
+          </a:prstGeom>
+          <a:noFill/>
+        </p:spPr>
+        <p:txBody>
+          <a:bodyPr wrap="none" rtlCol="0">
+            <a:spAutoFit/>
+          </a:bodyPr>
+          <a:lstStyle/>
+          <a:p>
+            <a:r>
+              <a:rPr lang="zh-TW" altLang="en-US" sz="4800" dirty="0">
+                <a:solidFill>
+                  <a:srgbClr val="BDACD5"/>
+                </a:solidFill>
+                <a:latin typeface="宅在家麥克筆" panose="02020300000000000000" pitchFamily="18" charset="-120"/>
+                <a:ea typeface="宅在家麥克筆" panose="02020300000000000000" pitchFamily="18" charset="-120"/>
+                <a:cs typeface="宅在家麥克筆" panose="02020300000000000000" pitchFamily="18" charset="-120"/>
+              </a:rPr>
+              <a:t>阻礙</a:t>
+            </a:r>
+          </a:p>
+        </p:txBody>
+      </p:sp>
+    </p:spTree>
+    <p:extLst>
+      <p:ext uri="{BB962C8B-B14F-4D97-AF65-F5344CB8AC3E}">
+        <p14:creationId xmlns:p14="http://schemas.microsoft.com/office/powerpoint/2010/main" val="2208124858"/>
+      </p:ext>
+    </p:extLst>
+  </p:cSld>
+  <p:clrMapOvr>
+    <a:masterClrMapping/>
+  </p:clrMapOvr>
+</p:sld>
+</file>
+
+<file path=ppt/slides/slide4.xml><?xml version="1.0" encoding="utf-8"?>
+<p:sld xmlns:a="http://schemas.openxmlformats.org/drawingml/2006/main" xmlns:r="http://schemas.openxmlformats.org/officeDocument/2006/relationships" xmlns:p="http://schemas.openxmlformats.org/presentationml/2006/main">
+  <p:cSld>
+    <p:spTree>
+      <p:nvGrpSpPr>
+        <p:cNvPr id="1" name="">
+          <a:extLst>
+            <a:ext uri="{FF2B5EF4-FFF2-40B4-BE49-F238E27FC236}">
+              <a16:creationId xmlns:a16="http://schemas.microsoft.com/office/drawing/2014/main" id="{9FB52777-B9B2-F10C-8025-DF4670B61B89}"/>
+            </a:ext>
+          </a:extLst>
+        </p:cNvPr>
+        <p:cNvGrpSpPr/>
+        <p:nvPr/>
+      </p:nvGrpSpPr>
+      <p:grpSpPr>
+        <a:xfrm>
+          <a:off x="0" y="0"/>
+          <a:ext cx="0" cy="0"/>
+          <a:chOff x="0" y="0"/>
+          <a:chExt cx="0" cy="0"/>
+        </a:xfrm>
+      </p:grpSpPr>
+      <p:pic>
+        <p:nvPicPr>
+          <p:cNvPr id="3" name="圖片 2">
+            <a:extLst>
+              <a:ext uri="{FF2B5EF4-FFF2-40B4-BE49-F238E27FC236}">
+                <a16:creationId xmlns:a16="http://schemas.microsoft.com/office/drawing/2014/main" id="{95535C8C-B4B8-494C-3DBC-9CC371C05E8F}"/>
+              </a:ext>
+            </a:extLst>
+          </p:cNvPr>
+          <p:cNvPicPr>
+            <a:picLocks noChangeAspect="1"/>
+          </p:cNvPicPr>
+          <p:nvPr/>
+        </p:nvPicPr>
+        <p:blipFill>
+          <a:blip r:embed="rId3"/>
+          <a:srcRect/>
+          <a:stretch/>
+        </p:blipFill>
+        <p:spPr>
+          <a:xfrm>
+            <a:off x="2321278" y="290102"/>
+            <a:ext cx="5264856" cy="5264856"/>
+          </a:xfrm>
+          <a:prstGeom prst="rect">
+            <a:avLst/>
+          </a:prstGeom>
+        </p:spPr>
+      </p:pic>
+      <p:pic>
+        <p:nvPicPr>
+          <p:cNvPr id="12" name="圖片 11">
+            <a:extLst>
+              <a:ext uri="{FF2B5EF4-FFF2-40B4-BE49-F238E27FC236}">
+                <a16:creationId xmlns:a16="http://schemas.microsoft.com/office/drawing/2014/main" id="{8EEB2AFE-5775-EC4A-0996-D5D1834688B0}"/>
+              </a:ext>
+            </a:extLst>
+          </p:cNvPr>
+          <p:cNvPicPr>
+            <a:picLocks noChangeAspect="1"/>
+          </p:cNvPicPr>
+          <p:nvPr/>
+        </p:nvPicPr>
+        <p:blipFill>
+          <a:blip r:embed="rId4"/>
+          <a:stretch>
+            <a:fillRect/>
+          </a:stretch>
+        </p:blipFill>
+        <p:spPr>
+          <a:xfrm>
+            <a:off x="0" y="1"/>
+            <a:ext cx="12192000" cy="6857999"/>
+          </a:xfrm>
+          <a:prstGeom prst="rect">
+            <a:avLst/>
+          </a:prstGeom>
+        </p:spPr>
+      </p:pic>
+      <p:sp>
+        <p:nvSpPr>
+          <p:cNvPr id="2" name="文字方塊 1">
+            <a:extLst>
+              <a:ext uri="{FF2B5EF4-FFF2-40B4-BE49-F238E27FC236}">
+                <a16:creationId xmlns:a16="http://schemas.microsoft.com/office/drawing/2014/main" id="{F2658C2D-EAFE-F72F-6044-041464A77194}"/>
+              </a:ext>
+            </a:extLst>
+          </p:cNvPr>
+          <p:cNvSpPr txBox="1"/>
+          <p:nvPr/>
+        </p:nvSpPr>
+        <p:spPr>
+          <a:xfrm>
+            <a:off x="740214" y="5736900"/>
+            <a:ext cx="1415772" cy="830997"/>
+          </a:xfrm>
+          <a:prstGeom prst="rect">
+            <a:avLst/>
+          </a:prstGeom>
+          <a:noFill/>
+        </p:spPr>
+        <p:txBody>
+          <a:bodyPr wrap="none" rtlCol="0">
+            <a:spAutoFit/>
+          </a:bodyPr>
+          <a:lstStyle/>
+          <a:p>
+            <a:r>
+              <a:rPr lang="zh-TW" altLang="en-US" sz="4800" dirty="0">
+                <a:solidFill>
+                  <a:srgbClr val="BDACD5"/>
+                </a:solidFill>
+                <a:latin typeface="宅在家麥克筆" panose="02020300000000000000" pitchFamily="18" charset="-120"/>
+                <a:ea typeface="宅在家麥克筆" panose="02020300000000000000" pitchFamily="18" charset="-120"/>
+                <a:cs typeface="宅在家麥克筆" panose="02020300000000000000" pitchFamily="18" charset="-120"/>
+              </a:rPr>
+              <a:t>努力</a:t>
+            </a:r>
+          </a:p>
+        </p:txBody>
+      </p:sp>
+    </p:spTree>
+    <p:extLst>
+      <p:ext uri="{BB962C8B-B14F-4D97-AF65-F5344CB8AC3E}">
+        <p14:creationId xmlns:p14="http://schemas.microsoft.com/office/powerpoint/2010/main" val="3919979454"/>
+      </p:ext>
+    </p:extLst>
+  </p:cSld>
+  <p:clrMapOvr>
+    <a:masterClrMapping/>
+  </p:clrMapOvr>
+</p:sld>
+</file>
+
+<file path=ppt/slides/slide5.xml><?xml version="1.0" encoding="utf-8"?>
+<p:sld xmlns:a="http://schemas.openxmlformats.org/drawingml/2006/main" xmlns:r="http://schemas.openxmlformats.org/officeDocument/2006/relationships" xmlns:p="http://schemas.openxmlformats.org/presentationml/2006/main">
+  <p:cSld>
+    <p:spTree>
+      <p:nvGrpSpPr>
+        <p:cNvPr id="1" name="">
+          <a:extLst>
+            <a:ext uri="{FF2B5EF4-FFF2-40B4-BE49-F238E27FC236}">
+              <a16:creationId xmlns:a16="http://schemas.microsoft.com/office/drawing/2014/main" id="{31662FDA-6EE2-BA93-39C5-1BB2D02B8E66}"/>
+            </a:ext>
+          </a:extLst>
+        </p:cNvPr>
+        <p:cNvGrpSpPr/>
+        <p:nvPr/>
+      </p:nvGrpSpPr>
+      <p:grpSpPr>
+        <a:xfrm>
+          <a:off x="0" y="0"/>
+          <a:ext cx="0" cy="0"/>
+          <a:chOff x="0" y="0"/>
+          <a:chExt cx="0" cy="0"/>
+        </a:xfrm>
+      </p:grpSpPr>
+      <p:pic>
+        <p:nvPicPr>
+          <p:cNvPr id="3" name="圖片 2">
+            <a:extLst>
+              <a:ext uri="{FF2B5EF4-FFF2-40B4-BE49-F238E27FC236}">
+                <a16:creationId xmlns:a16="http://schemas.microsoft.com/office/drawing/2014/main" id="{46F323F8-9A08-C863-1B93-8CA3C0F43333}"/>
+              </a:ext>
+            </a:extLst>
+          </p:cNvPr>
+          <p:cNvPicPr>
+            <a:picLocks noChangeAspect="1"/>
+          </p:cNvPicPr>
+          <p:nvPr/>
+        </p:nvPicPr>
+        <p:blipFill>
+          <a:blip r:embed="rId3"/>
+          <a:srcRect/>
+          <a:stretch/>
+        </p:blipFill>
+        <p:spPr>
+          <a:xfrm>
+            <a:off x="2321278" y="290102"/>
+            <a:ext cx="5264856" cy="5264856"/>
+          </a:xfrm>
+          <a:prstGeom prst="rect">
+            <a:avLst/>
+          </a:prstGeom>
+        </p:spPr>
+      </p:pic>
+      <p:pic>
+        <p:nvPicPr>
+          <p:cNvPr id="12" name="圖片 11">
+            <a:extLst>
+              <a:ext uri="{FF2B5EF4-FFF2-40B4-BE49-F238E27FC236}">
+                <a16:creationId xmlns:a16="http://schemas.microsoft.com/office/drawing/2014/main" id="{4CF9CD14-F811-76A7-E099-292C2B260DBF}"/>
+              </a:ext>
+            </a:extLst>
+          </p:cNvPr>
+          <p:cNvPicPr>
+            <a:picLocks noChangeAspect="1"/>
+          </p:cNvPicPr>
+          <p:nvPr/>
+        </p:nvPicPr>
+        <p:blipFill>
+          <a:blip r:embed="rId4"/>
+          <a:stretch>
+            <a:fillRect/>
+          </a:stretch>
+        </p:blipFill>
+        <p:spPr>
+          <a:xfrm>
+            <a:off x="0" y="1"/>
+            <a:ext cx="12192000" cy="6857999"/>
+          </a:xfrm>
+          <a:prstGeom prst="rect">
+            <a:avLst/>
+          </a:prstGeom>
+        </p:spPr>
+      </p:pic>
+      <p:sp>
+        <p:nvSpPr>
+          <p:cNvPr id="2" name="文字方塊 1">
+            <a:extLst>
+              <a:ext uri="{FF2B5EF4-FFF2-40B4-BE49-F238E27FC236}">
+                <a16:creationId xmlns:a16="http://schemas.microsoft.com/office/drawing/2014/main" id="{E146F7FC-99BF-6BFD-545A-7408D68CDDAA}"/>
+              </a:ext>
+            </a:extLst>
+          </p:cNvPr>
+          <p:cNvSpPr txBox="1"/>
+          <p:nvPr/>
+        </p:nvSpPr>
+        <p:spPr>
+          <a:xfrm>
+            <a:off x="740214" y="5736900"/>
+            <a:ext cx="1415772" cy="830997"/>
+          </a:xfrm>
+          <a:prstGeom prst="rect">
+            <a:avLst/>
+          </a:prstGeom>
+          <a:noFill/>
+        </p:spPr>
+        <p:txBody>
+          <a:bodyPr wrap="none" rtlCol="0">
+            <a:spAutoFit/>
+          </a:bodyPr>
+          <a:lstStyle/>
+          <a:p>
+            <a:r>
+              <a:rPr lang="zh-TW" altLang="en-US" sz="4800" dirty="0">
+                <a:solidFill>
+                  <a:srgbClr val="BDACD5"/>
+                </a:solidFill>
+                <a:latin typeface="宅在家麥克筆" panose="02020300000000000000" pitchFamily="18" charset="-120"/>
+                <a:ea typeface="宅在家麥克筆" panose="02020300000000000000" pitchFamily="18" charset="-120"/>
+                <a:cs typeface="宅在家麥克筆" panose="02020300000000000000" pitchFamily="18" charset="-120"/>
+              </a:rPr>
+              <a:t>結果</a:t>
+            </a:r>
+          </a:p>
+        </p:txBody>
+      </p:sp>
+    </p:spTree>
+    <p:extLst>
+      <p:ext uri="{BB962C8B-B14F-4D97-AF65-F5344CB8AC3E}">
+        <p14:creationId xmlns:p14="http://schemas.microsoft.com/office/powerpoint/2010/main" val="1307455006"/>
+      </p:ext>
+    </p:extLst>
+  </p:cSld>
+  <p:clrMapOvr>
+    <a:masterClrMapping/>
+  </p:clrMapOvr>
+</p:sld>
+</file>
+
+<file path=ppt/slides/slide6.xml><?xml version="1.0" encoding="utf-8"?>
+<p:sld xmlns:a="http://schemas.openxmlformats.org/drawingml/2006/main" xmlns:r="http://schemas.openxmlformats.org/officeDocument/2006/relationships" xmlns:p="http://schemas.openxmlformats.org/presentationml/2006/main">
+  <p:cSld>
+    <p:spTree>
+      <p:nvGrpSpPr>
+        <p:cNvPr id="1" name="">
+          <a:extLst>
+            <a:ext uri="{FF2B5EF4-FFF2-40B4-BE49-F238E27FC236}">
+              <a16:creationId xmlns:a16="http://schemas.microsoft.com/office/drawing/2014/main" id="{D6DE065F-08B1-A3CD-CF55-C82B5FD05030}"/>
+            </a:ext>
+          </a:extLst>
+        </p:cNvPr>
+        <p:cNvGrpSpPr/>
+        <p:nvPr/>
+      </p:nvGrpSpPr>
+      <p:grpSpPr>
+        <a:xfrm>
+          <a:off x="0" y="0"/>
+          <a:ext cx="0" cy="0"/>
+          <a:chOff x="0" y="0"/>
+          <a:chExt cx="0" cy="0"/>
+        </a:xfrm>
+      </p:grpSpPr>
+      <p:pic>
+        <p:nvPicPr>
+          <p:cNvPr id="12" name="圖片 11">
+            <a:extLst>
+              <a:ext uri="{FF2B5EF4-FFF2-40B4-BE49-F238E27FC236}">
+                <a16:creationId xmlns:a16="http://schemas.microsoft.com/office/drawing/2014/main" id="{757474E6-9725-9EF9-C3D0-696687FB7E5B}"/>
+              </a:ext>
+            </a:extLst>
+          </p:cNvPr>
+          <p:cNvPicPr>
+            <a:picLocks noChangeAspect="1"/>
+          </p:cNvPicPr>
+          <p:nvPr/>
+        </p:nvPicPr>
+        <p:blipFill>
+          <a:blip r:embed="rId3"/>
+          <a:stretch>
+            <a:fillRect/>
+          </a:stretch>
+        </p:blipFill>
+        <p:spPr>
+          <a:xfrm>
+            <a:off x="0" y="1"/>
+            <a:ext cx="12192000" cy="6857999"/>
+          </a:xfrm>
+          <a:prstGeom prst="rect">
+            <a:avLst/>
+          </a:prstGeom>
+        </p:spPr>
+      </p:pic>
+      <p:sp>
+        <p:nvSpPr>
+          <p:cNvPr id="2" name="文字方塊 1">
+            <a:extLst>
+              <a:ext uri="{FF2B5EF4-FFF2-40B4-BE49-F238E27FC236}">
+                <a16:creationId xmlns:a16="http://schemas.microsoft.com/office/drawing/2014/main" id="{80DA01AE-B697-7391-6C32-3CDED960F930}"/>
+              </a:ext>
+            </a:extLst>
+          </p:cNvPr>
+          <p:cNvSpPr txBox="1"/>
+          <p:nvPr/>
+        </p:nvSpPr>
+        <p:spPr>
+          <a:xfrm>
+            <a:off x="740214" y="5736900"/>
+            <a:ext cx="1415772" cy="830997"/>
+          </a:xfrm>
+          <a:prstGeom prst="rect">
+            <a:avLst/>
+          </a:prstGeom>
+          <a:noFill/>
+        </p:spPr>
+        <p:txBody>
+          <a:bodyPr wrap="none" rtlCol="0">
+            <a:spAutoFit/>
+          </a:bodyPr>
+          <a:lstStyle/>
+          <a:p>
+            <a:r>
+              <a:rPr lang="zh-TW" altLang="en-US" sz="4800" dirty="0">
+                <a:solidFill>
+                  <a:srgbClr val="BDACD5"/>
+                </a:solidFill>
+                <a:latin typeface="宅在家麥克筆" panose="02020300000000000000" pitchFamily="18" charset="-120"/>
+                <a:ea typeface="宅在家麥克筆" panose="02020300000000000000" pitchFamily="18" charset="-120"/>
+                <a:cs typeface="宅在家麥克筆" panose="02020300000000000000" pitchFamily="18" charset="-120"/>
+              </a:rPr>
+              <a:t>意外</a:t>
+            </a:r>
+          </a:p>
+        </p:txBody>
+      </p:sp>
+      <p:pic>
+        <p:nvPicPr>
+          <p:cNvPr id="3" name="圖片 2">
+            <a:extLst>
+              <a:ext uri="{FF2B5EF4-FFF2-40B4-BE49-F238E27FC236}">
+                <a16:creationId xmlns:a16="http://schemas.microsoft.com/office/drawing/2014/main" id="{9F057F3D-F209-A8C0-7AA9-FDE3ED39B7A0}"/>
+              </a:ext>
+            </a:extLst>
+          </p:cNvPr>
+          <p:cNvPicPr>
+            <a:picLocks noChangeAspect="1"/>
+          </p:cNvPicPr>
+          <p:nvPr/>
+        </p:nvPicPr>
+        <p:blipFill>
+          <a:blip r:embed="rId4"/>
+          <a:srcRect/>
+          <a:stretch/>
+        </p:blipFill>
+        <p:spPr>
+          <a:xfrm>
+            <a:off x="2321278" y="290102"/>
+            <a:ext cx="5264856" cy="5264856"/>
+          </a:xfrm>
+          <a:prstGeom prst="rect">
+            <a:avLst/>
+          </a:prstGeom>
+        </p:spPr>
+      </p:pic>
+    </p:spTree>
+    <p:extLst>
+      <p:ext uri="{BB962C8B-B14F-4D97-AF65-F5344CB8AC3E}">
+        <p14:creationId xmlns:p14="http://schemas.microsoft.com/office/powerpoint/2010/main" val="2817758109"/>
+      </p:ext>
+    </p:extLst>
+  </p:cSld>
+  <p:clrMapOvr>
+    <a:masterClrMapping/>
+  </p:clrMapOvr>
+</p:sld>
+</file>
+
+<file path=ppt/slides/slide7.xml><?xml version="1.0" encoding="utf-8"?>
+<p:sld xmlns:a="http://schemas.openxmlformats.org/drawingml/2006/main" xmlns:r="http://schemas.openxmlformats.org/officeDocument/2006/relationships" xmlns:p="http://schemas.openxmlformats.org/presentationml/2006/main">
+  <p:cSld>
+    <p:spTree>
+      <p:nvGrpSpPr>
+        <p:cNvPr id="1" name="">
+          <a:extLst>
+            <a:ext uri="{FF2B5EF4-FFF2-40B4-BE49-F238E27FC236}">
+              <a16:creationId xmlns:a16="http://schemas.microsoft.com/office/drawing/2014/main" id="{2222CD43-FFCD-C466-34A2-0A37390D253E}"/>
+            </a:ext>
+          </a:extLst>
+        </p:cNvPr>
+        <p:cNvGrpSpPr/>
+        <p:nvPr/>
+      </p:nvGrpSpPr>
+      <p:grpSpPr>
+        <a:xfrm>
+          <a:off x="0" y="0"/>
+          <a:ext cx="0" cy="0"/>
+          <a:chOff x="0" y="0"/>
+          <a:chExt cx="0" cy="0"/>
+        </a:xfrm>
+      </p:grpSpPr>
+      <p:pic>
+        <p:nvPicPr>
+          <p:cNvPr id="3" name="圖片 2">
+            <a:extLst>
+              <a:ext uri="{FF2B5EF4-FFF2-40B4-BE49-F238E27FC236}">
+                <a16:creationId xmlns:a16="http://schemas.microsoft.com/office/drawing/2014/main" id="{878E296C-BC84-13AE-E91D-3AF4B1885010}"/>
+              </a:ext>
+            </a:extLst>
+          </p:cNvPr>
+          <p:cNvPicPr>
+            <a:picLocks noChangeAspect="1"/>
+          </p:cNvPicPr>
+          <p:nvPr/>
+        </p:nvPicPr>
+        <p:blipFill>
+          <a:blip r:embed="rId3"/>
+          <a:srcRect/>
+          <a:stretch/>
+        </p:blipFill>
+        <p:spPr>
+          <a:xfrm>
+            <a:off x="2321278" y="290102"/>
+            <a:ext cx="5264856" cy="5264856"/>
+          </a:xfrm>
+          <a:prstGeom prst="rect">
+            <a:avLst/>
+          </a:prstGeom>
+        </p:spPr>
+      </p:pic>
+      <p:pic>
+        <p:nvPicPr>
+          <p:cNvPr id="12" name="圖片 11">
+            <a:extLst>
+              <a:ext uri="{FF2B5EF4-FFF2-40B4-BE49-F238E27FC236}">
+                <a16:creationId xmlns:a16="http://schemas.microsoft.com/office/drawing/2014/main" id="{BC52E14E-8CBD-BEB7-024C-F5C4631B1724}"/>
+              </a:ext>
+            </a:extLst>
+          </p:cNvPr>
+          <p:cNvPicPr>
+            <a:picLocks noChangeAspect="1"/>
+          </p:cNvPicPr>
+          <p:nvPr/>
+        </p:nvPicPr>
+        <p:blipFill>
+          <a:blip r:embed="rId4"/>
+          <a:stretch>
+            <a:fillRect/>
+          </a:stretch>
+        </p:blipFill>
+        <p:spPr>
+          <a:xfrm>
+            <a:off x="0" y="1"/>
+            <a:ext cx="12192000" cy="6857999"/>
+          </a:xfrm>
+          <a:prstGeom prst="rect">
+            <a:avLst/>
+          </a:prstGeom>
+        </p:spPr>
+      </p:pic>
+      <p:sp>
+        <p:nvSpPr>
+          <p:cNvPr id="2" name="文字方塊 1">
+            <a:extLst>
+              <a:ext uri="{FF2B5EF4-FFF2-40B4-BE49-F238E27FC236}">
+                <a16:creationId xmlns:a16="http://schemas.microsoft.com/office/drawing/2014/main" id="{5D6B0C61-00E2-5047-D47A-391DEDD3F08D}"/>
+              </a:ext>
+            </a:extLst>
+          </p:cNvPr>
+          <p:cNvSpPr txBox="1"/>
+          <p:nvPr/>
+        </p:nvSpPr>
+        <p:spPr>
+          <a:xfrm>
+            <a:off x="740214" y="5736900"/>
+            <a:ext cx="1415772" cy="830997"/>
+          </a:xfrm>
+          <a:prstGeom prst="rect">
+            <a:avLst/>
+          </a:prstGeom>
+          <a:noFill/>
+        </p:spPr>
+        <p:txBody>
+          <a:bodyPr wrap="none" rtlCol="0">
+            <a:spAutoFit/>
+          </a:bodyPr>
+          <a:lstStyle/>
+          <a:p>
+            <a:r>
+              <a:rPr lang="zh-TW" altLang="en-US" sz="4800" dirty="0">
+                <a:solidFill>
+                  <a:srgbClr val="BDACD5"/>
+                </a:solidFill>
+                <a:latin typeface="宅在家麥克筆" panose="02020300000000000000" pitchFamily="18" charset="-120"/>
+                <a:ea typeface="宅在家麥克筆" panose="02020300000000000000" pitchFamily="18" charset="-120"/>
+                <a:cs typeface="宅在家麥克筆" panose="02020300000000000000" pitchFamily="18" charset="-120"/>
+              </a:rPr>
+              <a:t>轉彎</a:t>
+            </a:r>
+          </a:p>
+        </p:txBody>
+      </p:sp>
+    </p:spTree>
+    <p:extLst>
+      <p:ext uri="{BB962C8B-B14F-4D97-AF65-F5344CB8AC3E}">
+        <p14:creationId xmlns:p14="http://schemas.microsoft.com/office/powerpoint/2010/main" val="3554184782"/>
+      </p:ext>
+    </p:extLst>
+  </p:cSld>
+  <p:clrMapOvr>
+    <a:masterClrMapping/>
+  </p:clrMapOvr>
+</p:sld>
+</file>
+
+<file path=ppt/slides/slide8.xml><?xml version="1.0" encoding="utf-8"?>
+<p:sld xmlns:a="http://schemas.openxmlformats.org/drawingml/2006/main" xmlns:r="http://schemas.openxmlformats.org/officeDocument/2006/relationships" xmlns:p="http://schemas.openxmlformats.org/presentationml/2006/main">
+  <p:cSld>
+    <p:spTree>
+      <p:nvGrpSpPr>
+        <p:cNvPr id="1" name="">
+          <a:extLst>
+            <a:ext uri="{FF2B5EF4-FFF2-40B4-BE49-F238E27FC236}">
+              <a16:creationId xmlns:a16="http://schemas.microsoft.com/office/drawing/2014/main" id="{BF28B26D-5781-8463-B8C6-B6D6FB1E5BBE}"/>
+            </a:ext>
+          </a:extLst>
+        </p:cNvPr>
+        <p:cNvGrpSpPr/>
+        <p:nvPr/>
+      </p:nvGrpSpPr>
+      <p:grpSpPr>
+        <a:xfrm>
+          <a:off x="0" y="0"/>
+          <a:ext cx="0" cy="0"/>
+          <a:chOff x="0" y="0"/>
+          <a:chExt cx="0" cy="0"/>
+        </a:xfrm>
+      </p:grpSpPr>
+      <p:pic>
+        <p:nvPicPr>
+          <p:cNvPr id="3" name="圖片 2">
+            <a:extLst>
+              <a:ext uri="{FF2B5EF4-FFF2-40B4-BE49-F238E27FC236}">
+                <a16:creationId xmlns:a16="http://schemas.microsoft.com/office/drawing/2014/main" id="{01B21024-CA38-3582-002F-A7CCC7E7F539}"/>
+              </a:ext>
+            </a:extLst>
+          </p:cNvPr>
+          <p:cNvPicPr>
+            <a:picLocks noChangeAspect="1"/>
+          </p:cNvPicPr>
+          <p:nvPr/>
+        </p:nvPicPr>
+        <p:blipFill>
+          <a:blip r:embed="rId3"/>
+          <a:srcRect/>
+          <a:stretch/>
+        </p:blipFill>
+        <p:spPr>
+          <a:xfrm>
+            <a:off x="2321278" y="290102"/>
+            <a:ext cx="5264856" cy="5264856"/>
+          </a:xfrm>
+          <a:prstGeom prst="rect">
+            <a:avLst/>
+          </a:prstGeom>
+        </p:spPr>
+      </p:pic>
+      <p:pic>
+        <p:nvPicPr>
+          <p:cNvPr id="12" name="圖片 11">
+            <a:extLst>
+              <a:ext uri="{FF2B5EF4-FFF2-40B4-BE49-F238E27FC236}">
+                <a16:creationId xmlns:a16="http://schemas.microsoft.com/office/drawing/2014/main" id="{B0210FEA-C93D-587C-DBD1-AAD083EDB691}"/>
+              </a:ext>
+            </a:extLst>
+          </p:cNvPr>
+          <p:cNvPicPr>
+            <a:picLocks noChangeAspect="1"/>
+          </p:cNvPicPr>
+          <p:nvPr/>
+        </p:nvPicPr>
+        <p:blipFill>
+          <a:blip r:embed="rId4"/>
+          <a:stretch>
+            <a:fillRect/>
+          </a:stretch>
+        </p:blipFill>
+        <p:spPr>
+          <a:xfrm>
+            <a:off x="0" y="1"/>
+            <a:ext cx="12192000" cy="6857999"/>
+          </a:xfrm>
+          <a:prstGeom prst="rect">
+            <a:avLst/>
+          </a:prstGeom>
+        </p:spPr>
+      </p:pic>
+      <p:sp>
+        <p:nvSpPr>
+          <p:cNvPr id="2" name="文字方塊 1">
+            <a:extLst>
+              <a:ext uri="{FF2B5EF4-FFF2-40B4-BE49-F238E27FC236}">
+                <a16:creationId xmlns:a16="http://schemas.microsoft.com/office/drawing/2014/main" id="{F9D95EDC-604F-C347-3B83-CC6B8A3F544F}"/>
+              </a:ext>
+            </a:extLst>
+          </p:cNvPr>
+          <p:cNvSpPr txBox="1"/>
+          <p:nvPr/>
+        </p:nvSpPr>
+        <p:spPr>
+          <a:xfrm>
+            <a:off x="740214" y="5736900"/>
+            <a:ext cx="1415772" cy="830997"/>
+          </a:xfrm>
+          <a:prstGeom prst="rect">
+            <a:avLst/>
+          </a:prstGeom>
+          <a:noFill/>
+        </p:spPr>
+        <p:txBody>
+          <a:bodyPr wrap="none" rtlCol="0">
+            <a:spAutoFit/>
+          </a:bodyPr>
+          <a:lstStyle/>
+          <a:p>
+            <a:r>
+              <a:rPr lang="zh-TW" altLang="en-US" sz="4800" dirty="0">
+                <a:solidFill>
+                  <a:srgbClr val="BDACD5"/>
+                </a:solidFill>
+                <a:latin typeface="宅在家麥克筆" panose="02020300000000000000" pitchFamily="18" charset="-120"/>
+                <a:ea typeface="宅在家麥克筆" panose="02020300000000000000" pitchFamily="18" charset="-120"/>
+                <a:cs typeface="宅在家麥克筆" panose="02020300000000000000" pitchFamily="18" charset="-120"/>
+              </a:rPr>
+              <a:t>結局</a:t>
+            </a:r>
+          </a:p>
+        </p:txBody>
+      </p:sp>
+    </p:spTree>
+    <p:extLst>
+      <p:ext uri="{BB962C8B-B14F-4D97-AF65-F5344CB8AC3E}">
+        <p14:creationId xmlns:p14="http://schemas.microsoft.com/office/powerpoint/2010/main" val="3283585565"/>
       </p:ext>
     </p:extLst>
   </p:cSld>
@@ -3677,4 +5774,299 @@
     </a:ext>
   </a:extLst>
 </a:theme>
+</file>
+
+<file path=ppt/theme/theme2.xml><?xml version="1.0" encoding="utf-8"?>
+<a:theme xmlns:a="http://schemas.openxmlformats.org/drawingml/2006/main" name="Office 佈景主題">
+  <a:themeElements>
+    <a:clrScheme name="Office">
+      <a:dk1>
+        <a:sysClr val="windowText" lastClr="000000"/>
+      </a:dk1>
+      <a:lt1>
+        <a:sysClr val="window" lastClr="FFFFFF"/>
+      </a:lt1>
+      <a:dk2>
+        <a:srgbClr val="44546A"/>
+      </a:dk2>
+      <a:lt2>
+        <a:srgbClr val="E7E6E6"/>
+      </a:lt2>
+      <a:accent1>
+        <a:srgbClr val="4472C4"/>
+      </a:accent1>
+      <a:accent2>
+        <a:srgbClr val="ED7D31"/>
+      </a:accent2>
+      <a:accent3>
+        <a:srgbClr val="A5A5A5"/>
+      </a:accent3>
+      <a:accent4>
+        <a:srgbClr val="FFC000"/>
+      </a:accent4>
+      <a:accent5>
+        <a:srgbClr val="5B9BD5"/>
+      </a:accent5>
+      <a:accent6>
+        <a:srgbClr val="70AD47"/>
+      </a:accent6>
+      <a:hlink>
+        <a:srgbClr val="0563C1"/>
+      </a:hlink>
+      <a:folHlink>
+        <a:srgbClr val="954F72"/>
+      </a:folHlink>
+    </a:clrScheme>
+    <a:fontScheme name="Office">
+      <a:majorFont>
+        <a:latin typeface="Calibri Light" panose="020F0302020204030204"/>
+        <a:ea typeface=""/>
+        <a:cs typeface=""/>
+        <a:font script="Jpan" typeface="游ゴシック Light"/>
+        <a:font script="Hang" typeface="맑은 고딕"/>
+        <a:font script="Hans" typeface="等线 Light"/>
+        <a:font script="Hant" typeface="新細明體"/>
+        <a:font script="Arab" typeface="Times New Roman"/>
+        <a:font script="Hebr" typeface="Times New Roman"/>
+        <a:font script="Thai" typeface="Angsana New"/>
+        <a:font script="Ethi" typeface="Nyala"/>
+        <a:font script="Beng" typeface="Vrinda"/>
+        <a:font script="Gujr" typeface="Shruti"/>
+        <a:font script="Khmr" typeface="MoolBoran"/>
+        <a:font script="Knda" typeface="Tunga"/>
+        <a:font script="Guru" typeface="Raavi"/>
+        <a:font script="Cans" typeface="Euphemia"/>
+        <a:font script="Cher" typeface="Plantagenet Cherokee"/>
+        <a:font script="Yiii" typeface="Microsoft Yi Baiti"/>
+        <a:font script="Tibt" typeface="Microsoft Himalaya"/>
+        <a:font script="Thaa" typeface="MV Boli"/>
+        <a:font script="Deva" typeface="Mangal"/>
+        <a:font script="Telu" typeface="Gautami"/>
+        <a:font script="Taml" typeface="Latha"/>
+        <a:font script="Syrc" typeface="Estrangelo Edessa"/>
+        <a:font script="Orya" typeface="Kalinga"/>
+        <a:font script="Mlym" typeface="Kartika"/>
+        <a:font script="Laoo" typeface="DokChampa"/>
+        <a:font script="Sinh" typeface="Iskoola Pota"/>
+        <a:font script="Mong" typeface="Mongolian Baiti"/>
+        <a:font script="Viet" typeface="Times New Roman"/>
+        <a:font script="Uigh" typeface="Microsoft Uighur"/>
+        <a:font script="Geor" typeface="Sylfaen"/>
+        <a:font script="Armn" typeface="Arial"/>
+        <a:font script="Bugi" typeface="Leelawadee UI"/>
+        <a:font script="Bopo" typeface="Microsoft JhengHei"/>
+        <a:font script="Java" typeface="Javanese Text"/>
+        <a:font script="Lisu" typeface="Segoe UI"/>
+        <a:font script="Mymr" typeface="Myanmar Text"/>
+        <a:font script="Nkoo" typeface="Ebrima"/>
+        <a:font script="Olck" typeface="Nirmala UI"/>
+        <a:font script="Osma" typeface="Ebrima"/>
+        <a:font script="Phag" typeface="Phagspa"/>
+        <a:font script="Syrn" typeface="Estrangelo Edessa"/>
+        <a:font script="Syrj" typeface="Estrangelo Edessa"/>
+        <a:font script="Syre" typeface="Estrangelo Edessa"/>
+        <a:font script="Sora" typeface="Nirmala UI"/>
+        <a:font script="Tale" typeface="Microsoft Tai Le"/>
+        <a:font script="Talu" typeface="Microsoft New Tai Lue"/>
+        <a:font script="Tfng" typeface="Ebrima"/>
+      </a:majorFont>
+      <a:minorFont>
+        <a:latin typeface="Calibri" panose="020F0502020204030204"/>
+        <a:ea typeface=""/>
+        <a:cs typeface=""/>
+        <a:font script="Jpan" typeface="游ゴシック"/>
+        <a:font script="Hang" typeface="맑은 고딕"/>
+        <a:font script="Hans" typeface="等线"/>
+        <a:font script="Hant" typeface="新細明體"/>
+        <a:font script="Arab" typeface="Arial"/>
+        <a:font script="Hebr" typeface="Arial"/>
+        <a:font script="Thai" typeface="Cordia New"/>
+        <a:font script="Ethi" typeface="Nyala"/>
+        <a:font script="Beng" typeface="Vrinda"/>
+        <a:font script="Gujr" typeface="Shruti"/>
+        <a:font script="Khmr" typeface="DaunPenh"/>
+        <a:font script="Knda" typeface="Tunga"/>
+        <a:font script="Guru" typeface="Raavi"/>
+        <a:font script="Cans" typeface="Euphemia"/>
+        <a:font script="Cher" typeface="Plantagenet Cherokee"/>
+        <a:font script="Yiii" typeface="Microsoft Yi Baiti"/>
+        <a:font script="Tibt" typeface="Microsoft Himalaya"/>
+        <a:font script="Thaa" typeface="MV Boli"/>
+        <a:font script="Deva" typeface="Mangal"/>
+        <a:font script="Telu" typeface="Gautami"/>
+        <a:font script="Taml" typeface="Latha"/>
+        <a:font script="Syrc" typeface="Estrangelo Edessa"/>
+        <a:font script="Orya" typeface="Kalinga"/>
+        <a:font script="Mlym" typeface="Kartika"/>
+        <a:font script="Laoo" typeface="DokChampa"/>
+        <a:font script="Sinh" typeface="Iskoola Pota"/>
+        <a:font script="Mong" typeface="Mongolian Baiti"/>
+        <a:font script="Viet" typeface="Arial"/>
+        <a:font script="Uigh" typeface="Microsoft Uighur"/>
+        <a:font script="Geor" typeface="Sylfaen"/>
+        <a:font script="Armn" typeface="Arial"/>
+        <a:font script="Bugi" typeface="Leelawadee UI"/>
+        <a:font script="Bopo" typeface="Microsoft JhengHei"/>
+        <a:font script="Java" typeface="Javanese Text"/>
+        <a:font script="Lisu" typeface="Segoe UI"/>
+        <a:font script="Mymr" typeface="Myanmar Text"/>
+        <a:font script="Nkoo" typeface="Ebrima"/>
+        <a:font script="Olck" typeface="Nirmala UI"/>
+        <a:font script="Osma" typeface="Ebrima"/>
+        <a:font script="Phag" typeface="Phagspa"/>
+        <a:font script="Syrn" typeface="Estrangelo Edessa"/>
+        <a:font script="Syrj" typeface="Estrangelo Edessa"/>
+        <a:font script="Syre" typeface="Estrangelo Edessa"/>
+        <a:font script="Sora" typeface="Nirmala UI"/>
+        <a:font script="Tale" typeface="Microsoft Tai Le"/>
+        <a:font script="Talu" typeface="Microsoft New Tai Lue"/>
+        <a:font script="Tfng" typeface="Ebrima"/>
+      </a:minorFont>
+    </a:fontScheme>
+    <a:fmtScheme name="Office">
+      <a:fillStyleLst>
+        <a:solidFill>
+          <a:schemeClr val="phClr"/>
+        </a:solidFill>
+        <a:gradFill rotWithShape="1">
+          <a:gsLst>
+            <a:gs pos="0">
+              <a:schemeClr val="phClr">
+                <a:lumMod val="110000"/>
+                <a:satMod val="105000"/>
+                <a:tint val="67000"/>
+              </a:schemeClr>
+            </a:gs>
+            <a:gs pos="50000">
+              <a:schemeClr val="phClr">
+                <a:lumMod val="105000"/>
+                <a:satMod val="103000"/>
+                <a:tint val="73000"/>
+              </a:schemeClr>
+            </a:gs>
+            <a:gs pos="100000">
+              <a:schemeClr val="phClr">
+                <a:lumMod val="105000"/>
+                <a:satMod val="109000"/>
+                <a:tint val="81000"/>
+              </a:schemeClr>
+            </a:gs>
+          </a:gsLst>
+          <a:lin ang="5400000" scaled="0"/>
+        </a:gradFill>
+        <a:gradFill rotWithShape="1">
+          <a:gsLst>
+            <a:gs pos="0">
+              <a:schemeClr val="phClr">
+                <a:satMod val="103000"/>
+                <a:lumMod val="102000"/>
+                <a:tint val="94000"/>
+              </a:schemeClr>
+            </a:gs>
+            <a:gs pos="50000">
+              <a:schemeClr val="phClr">
+                <a:satMod val="110000"/>
+                <a:lumMod val="100000"/>
+                <a:shade val="100000"/>
+              </a:schemeClr>
+            </a:gs>
+            <a:gs pos="100000">
+              <a:schemeClr val="phClr">
+                <a:lumMod val="99000"/>
+                <a:satMod val="120000"/>
+                <a:shade val="78000"/>
+              </a:schemeClr>
+            </a:gs>
+          </a:gsLst>
+          <a:lin ang="5400000" scaled="0"/>
+        </a:gradFill>
+      </a:fillStyleLst>
+      <a:lnStyleLst>
+        <a:ln w="6350" cap="flat" cmpd="sng" algn="ctr">
+          <a:solidFill>
+            <a:schemeClr val="phClr"/>
+          </a:solidFill>
+          <a:prstDash val="solid"/>
+          <a:miter lim="800000"/>
+        </a:ln>
+        <a:ln w="12700" cap="flat" cmpd="sng" algn="ctr">
+          <a:solidFill>
+            <a:schemeClr val="phClr"/>
+          </a:solidFill>
+          <a:prstDash val="solid"/>
+          <a:miter lim="800000"/>
+        </a:ln>
+        <a:ln w="19050" cap="flat" cmpd="sng" algn="ctr">
+          <a:solidFill>
+            <a:schemeClr val="phClr"/>
+          </a:solidFill>
+          <a:prstDash val="solid"/>
+          <a:miter lim="800000"/>
+        </a:ln>
+      </a:lnStyleLst>
+      <a:effectStyleLst>
+        <a:effectStyle>
+          <a:effectLst/>
+        </a:effectStyle>
+        <a:effectStyle>
+          <a:effectLst/>
+        </a:effectStyle>
+        <a:effectStyle>
+          <a:effectLst>
+            <a:outerShdw blurRad="57150" dist="19050" dir="5400000" algn="ctr" rotWithShape="0">
+              <a:srgbClr val="000000">
+                <a:alpha val="63000"/>
+              </a:srgbClr>
+            </a:outerShdw>
+          </a:effectLst>
+        </a:effectStyle>
+      </a:effectStyleLst>
+      <a:bgFillStyleLst>
+        <a:solidFill>
+          <a:schemeClr val="phClr"/>
+        </a:solidFill>
+        <a:solidFill>
+          <a:schemeClr val="phClr">
+            <a:tint val="95000"/>
+            <a:satMod val="170000"/>
+          </a:schemeClr>
+        </a:solidFill>
+        <a:gradFill rotWithShape="1">
+          <a:gsLst>
+            <a:gs pos="0">
+              <a:schemeClr val="phClr">
+                <a:tint val="93000"/>
+                <a:satMod val="150000"/>
+                <a:shade val="98000"/>
+                <a:lumMod val="102000"/>
+              </a:schemeClr>
+            </a:gs>
+            <a:gs pos="50000">
+              <a:schemeClr val="phClr">
+                <a:tint val="98000"/>
+                <a:satMod val="130000"/>
+                <a:shade val="90000"/>
+                <a:lumMod val="103000"/>
+              </a:schemeClr>
+            </a:gs>
+            <a:gs pos="100000">
+              <a:schemeClr val="phClr">
+                <a:shade val="63000"/>
+                <a:satMod val="120000"/>
+              </a:schemeClr>
+            </a:gs>
+          </a:gsLst>
+          <a:lin ang="5400000" scaled="0"/>
+        </a:gradFill>
+      </a:bgFillStyleLst>
+    </a:fmtScheme>
+  </a:themeElements>
+  <a:objectDefaults/>
+  <a:extraClrSchemeLst/>
+  <a:extLst>
+    <a:ext uri="{05A4C25C-085E-4340-85A3-A5531E510DB2}">
+      <thm15:themeFamily xmlns:thm15="http://schemas.microsoft.com/office/thememl/2012/main" name="Office Theme" id="{62F939B6-93AF-4DB8-9C6B-D6C7DFDC589F}" vid="{4A3C46E8-61CC-4603-A589-7422A47A8E4A}"/>
+    </a:ext>
+  </a:extLst>
+</a:theme>
 </file>
</xml_diff>